<commit_message>
Add required css. Implemented concatenation task of JS files
</commit_message>
<xml_diff>
--- a/Gulp Basics.pptx
+++ b/Gulp Basics.pptx
@@ -5,7 +5,7 @@
     <p:sldMasterId id="2147483648" r:id="rId1"/>
   </p:sldMasterIdLst>
   <p:notesMasterIdLst>
-    <p:notesMasterId r:id="rId9"/>
+    <p:notesMasterId r:id="rId16"/>
   </p:notesMasterIdLst>
   <p:sldIdLst>
     <p:sldId id="256" r:id="rId2"/>
@@ -15,6 +15,13 @@
     <p:sldId id="260" r:id="rId6"/>
     <p:sldId id="261" r:id="rId7"/>
     <p:sldId id="262" r:id="rId8"/>
+    <p:sldId id="263" r:id="rId9"/>
+    <p:sldId id="264" r:id="rId10"/>
+    <p:sldId id="265" r:id="rId11"/>
+    <p:sldId id="266" r:id="rId12"/>
+    <p:sldId id="267" r:id="rId13"/>
+    <p:sldId id="268" r:id="rId14"/>
+    <p:sldId id="269" r:id="rId15"/>
   </p:sldIdLst>
   <p:sldSz cx="12192000" cy="6858000"/>
   <p:notesSz cx="6858000" cy="9144000"/>
@@ -876,6 +883,129 @@
     <p:extLst>
       <p:ext uri="{BB962C8B-B14F-4D97-AF65-F5344CB8AC3E}">
         <p14:creationId xmlns:p14="http://schemas.microsoft.com/office/powerpoint/2010/main" val="1710575698"/>
+      </p:ext>
+    </p:extLst>
+  </p:cSld>
+  <p:clrMapOvr>
+    <a:masterClrMapping/>
+  </p:clrMapOvr>
+</p:notes>
+</file>
+
+<file path=ppt/notesSlides/notesSlide4.xml><?xml version="1.0" encoding="utf-8"?>
+<p:notes xmlns:a="http://schemas.openxmlformats.org/drawingml/2006/main" xmlns:r="http://schemas.openxmlformats.org/officeDocument/2006/relationships" xmlns:p="http://schemas.openxmlformats.org/presentationml/2006/main">
+  <p:cSld>
+    <p:spTree>
+      <p:nvGrpSpPr>
+        <p:cNvPr id="1" name=""/>
+        <p:cNvGrpSpPr/>
+        <p:nvPr/>
+      </p:nvGrpSpPr>
+      <p:grpSpPr>
+        <a:xfrm>
+          <a:off x="0" y="0"/>
+          <a:ext cx="0" cy="0"/>
+          <a:chOff x="0" y="0"/>
+          <a:chExt cx="0" cy="0"/>
+        </a:xfrm>
+      </p:grpSpPr>
+      <p:sp>
+        <p:nvSpPr>
+          <p:cNvPr id="2" name="Slide Image Placeholder 1"/>
+          <p:cNvSpPr>
+            <a:spLocks noGrp="1" noRot="1" noChangeAspect="1"/>
+          </p:cNvSpPr>
+          <p:nvPr>
+            <p:ph type="sldImg"/>
+          </p:nvPr>
+        </p:nvSpPr>
+        <p:spPr/>
+      </p:sp>
+      <p:sp>
+        <p:nvSpPr>
+          <p:cNvPr id="3" name="Notes Placeholder 2"/>
+          <p:cNvSpPr>
+            <a:spLocks noGrp="1"/>
+          </p:cNvSpPr>
+          <p:nvPr>
+            <p:ph type="body" idx="1"/>
+          </p:nvPr>
+        </p:nvSpPr>
+        <p:spPr/>
+        <p:txBody>
+          <a:bodyPr/>
+          <a:lstStyle/>
+          <a:p>
+            <a:pPr marL="0" marR="0" indent="0" algn="l" defTabSz="914400" rtl="0" eaLnBrk="1" fontAlgn="auto" latinLnBrk="0" hangingPunct="1">
+              <a:lnSpc>
+                <a:spcPct val="100000"/>
+              </a:lnSpc>
+              <a:spcBef>
+                <a:spcPts val="0"/>
+              </a:spcBef>
+              <a:spcAft>
+                <a:spcPts val="0"/>
+              </a:spcAft>
+              <a:buClrTx/>
+              <a:buSzTx/>
+              <a:buFontTx/>
+              <a:buNone/>
+              <a:tabLst/>
+              <a:defRPr/>
+            </a:pPr>
+            <a:r>
+              <a:rPr lang="en-US" dirty="0" smtClean="0"/>
+              <a:t>In this case it matters that the </a:t>
+            </a:r>
+            <a:r>
+              <a:rPr lang="en-US" dirty="0" err="1" smtClean="0"/>
+              <a:t>jQuery</a:t>
+            </a:r>
+            <a:r>
+              <a:rPr lang="en-US" dirty="0" smtClean="0"/>
+              <a:t> code comes before the </a:t>
+            </a:r>
+            <a:r>
+              <a:rPr lang="en-US" dirty="0" err="1" smtClean="0"/>
+              <a:t>jQuery</a:t>
+            </a:r>
+            <a:r>
+              <a:rPr lang="en-US" dirty="0" smtClean="0"/>
+              <a:t> sticky plugin. Additionally, our custom code in main.js depends on both of these, and so it needs to come last.</a:t>
+            </a:r>
+          </a:p>
+          <a:p>
+            <a:endParaRPr lang="en-US" dirty="0"/>
+          </a:p>
+        </p:txBody>
+      </p:sp>
+      <p:sp>
+        <p:nvSpPr>
+          <p:cNvPr id="4" name="Slide Number Placeholder 3"/>
+          <p:cNvSpPr>
+            <a:spLocks noGrp="1"/>
+          </p:cNvSpPr>
+          <p:nvPr>
+            <p:ph type="sldNum" sz="quarter" idx="10"/>
+          </p:nvPr>
+        </p:nvSpPr>
+        <p:spPr/>
+        <p:txBody>
+          <a:bodyPr/>
+          <a:lstStyle/>
+          <a:p>
+            <a:fld id="{1C158C89-918F-4DDB-B390-802C7B3EF181}" type="slidenum">
+              <a:rPr lang="en-US" smtClean="0"/>
+              <a:t>12</a:t>
+            </a:fld>
+            <a:endParaRPr lang="en-US"/>
+          </a:p>
+        </p:txBody>
+      </p:sp>
+    </p:spTree>
+    <p:extLst>
+      <p:ext uri="{BB962C8B-B14F-4D97-AF65-F5344CB8AC3E}">
+        <p14:creationId xmlns:p14="http://schemas.microsoft.com/office/powerpoint/2010/main" val="2865668715"/>
       </p:ext>
     </p:extLst>
   </p:cSld>
@@ -3797,6 +3927,806 @@
 </p:sld>
 </file>
 
+<file path=ppt/slides/slide10.xml><?xml version="1.0" encoding="utf-8"?>
+<p:sld xmlns:a="http://schemas.openxmlformats.org/drawingml/2006/main" xmlns:r="http://schemas.openxmlformats.org/officeDocument/2006/relationships" xmlns:p="http://schemas.openxmlformats.org/presentationml/2006/main">
+  <p:cSld>
+    <p:spTree>
+      <p:nvGrpSpPr>
+        <p:cNvPr id="1" name=""/>
+        <p:cNvGrpSpPr/>
+        <p:nvPr/>
+      </p:nvGrpSpPr>
+      <p:grpSpPr>
+        <a:xfrm>
+          <a:off x="0" y="0"/>
+          <a:ext cx="0" cy="0"/>
+          <a:chOff x="0" y="0"/>
+          <a:chExt cx="0" cy="0"/>
+        </a:xfrm>
+      </p:grpSpPr>
+      <p:sp>
+        <p:nvSpPr>
+          <p:cNvPr id="2" name="Title 1"/>
+          <p:cNvSpPr>
+            <a:spLocks noGrp="1"/>
+          </p:cNvSpPr>
+          <p:nvPr>
+            <p:ph type="title"/>
+          </p:nvPr>
+        </p:nvSpPr>
+        <p:spPr/>
+        <p:txBody>
+          <a:bodyPr/>
+          <a:lstStyle/>
+          <a:p>
+            <a:r>
+              <a:rPr lang="en-US" dirty="0" smtClean="0"/>
+              <a:t>Gulp Plugins</a:t>
+            </a:r>
+            <a:endParaRPr lang="en-US" dirty="0"/>
+          </a:p>
+        </p:txBody>
+      </p:sp>
+      <p:sp>
+        <p:nvSpPr>
+          <p:cNvPr id="3" name="Content Placeholder 2"/>
+          <p:cNvSpPr>
+            <a:spLocks noGrp="1"/>
+          </p:cNvSpPr>
+          <p:nvPr>
+            <p:ph idx="1"/>
+          </p:nvPr>
+        </p:nvSpPr>
+        <p:spPr/>
+        <p:txBody>
+          <a:bodyPr/>
+          <a:lstStyle/>
+          <a:p>
+            <a:pPr fontAlgn="base"/>
+            <a:r>
+              <a:rPr lang="en-US" dirty="0"/>
+              <a:t>Plugins are incredibly useful, because they cover almost all of the </a:t>
+            </a:r>
+            <a:r>
+              <a:rPr lang="en-US" dirty="0" smtClean="0"/>
+              <a:t>things you </a:t>
+            </a:r>
+            <a:r>
+              <a:rPr lang="en-US" dirty="0"/>
+              <a:t>could ever want to do with your application, either in development, </a:t>
+            </a:r>
+            <a:r>
+              <a:rPr lang="en-US" dirty="0" smtClean="0"/>
+              <a:t>or in </a:t>
+            </a:r>
+            <a:r>
+              <a:rPr lang="en-US" dirty="0"/>
+              <a:t>production</a:t>
+            </a:r>
+            <a:r>
+              <a:rPr lang="en-US" dirty="0" smtClean="0"/>
+              <a:t>.</a:t>
+            </a:r>
+          </a:p>
+          <a:p>
+            <a:pPr marL="0" indent="0" fontAlgn="base">
+              <a:buNone/>
+            </a:pPr>
+            <a:endParaRPr lang="en-US" dirty="0"/>
+          </a:p>
+          <a:p>
+            <a:pPr fontAlgn="base"/>
+            <a:r>
+              <a:rPr lang="en-US" dirty="0" smtClean="0"/>
+              <a:t>You </a:t>
+            </a:r>
+            <a:r>
+              <a:rPr lang="en-US" dirty="0"/>
+              <a:t>should rarely, if ever, have to build these tasks from </a:t>
+            </a:r>
+            <a:r>
+              <a:rPr lang="en-US" dirty="0" smtClean="0"/>
+              <a:t>scratch. People </a:t>
+            </a:r>
+            <a:r>
+              <a:rPr lang="en-US" dirty="0"/>
+              <a:t>have built plugins that do things from compiling </a:t>
+            </a:r>
+            <a:r>
+              <a:rPr lang="en-US" dirty="0" smtClean="0"/>
+              <a:t>sass, to </a:t>
+            </a:r>
+            <a:r>
+              <a:rPr lang="en-US" dirty="0"/>
+              <a:t>pushing static sites, to get hub pages.</a:t>
+            </a:r>
+          </a:p>
+          <a:p>
+            <a:endParaRPr lang="en-US" dirty="0"/>
+          </a:p>
+        </p:txBody>
+      </p:sp>
+    </p:spTree>
+    <p:extLst>
+      <p:ext uri="{BB962C8B-B14F-4D97-AF65-F5344CB8AC3E}">
+        <p14:creationId xmlns:p14="http://schemas.microsoft.com/office/powerpoint/2010/main" val="1139234620"/>
+      </p:ext>
+    </p:extLst>
+  </p:cSld>
+  <p:clrMapOvr>
+    <a:masterClrMapping/>
+  </p:clrMapOvr>
+</p:sld>
+</file>
+
+<file path=ppt/slides/slide11.xml><?xml version="1.0" encoding="utf-8"?>
+<p:sld xmlns:a="http://schemas.openxmlformats.org/drawingml/2006/main" xmlns:r="http://schemas.openxmlformats.org/officeDocument/2006/relationships" xmlns:p="http://schemas.openxmlformats.org/presentationml/2006/main">
+  <p:cSld>
+    <p:spTree>
+      <p:nvGrpSpPr>
+        <p:cNvPr id="1" name=""/>
+        <p:cNvGrpSpPr/>
+        <p:nvPr/>
+      </p:nvGrpSpPr>
+      <p:grpSpPr>
+        <a:xfrm>
+          <a:off x="0" y="0"/>
+          <a:ext cx="0" cy="0"/>
+          <a:chOff x="0" y="0"/>
+          <a:chExt cx="0" cy="0"/>
+        </a:xfrm>
+      </p:grpSpPr>
+      <p:sp>
+        <p:nvSpPr>
+          <p:cNvPr id="2" name="Title 1"/>
+          <p:cNvSpPr>
+            <a:spLocks noGrp="1"/>
+          </p:cNvSpPr>
+          <p:nvPr>
+            <p:ph type="title"/>
+          </p:nvPr>
+        </p:nvSpPr>
+        <p:spPr/>
+        <p:txBody>
+          <a:bodyPr/>
+          <a:lstStyle/>
+          <a:p>
+            <a:r>
+              <a:rPr lang="en-US" dirty="0"/>
+              <a:t>gulp-</a:t>
+            </a:r>
+            <a:r>
+              <a:rPr lang="en-US" dirty="0" err="1"/>
+              <a:t>concat</a:t>
+            </a:r>
+            <a:r>
+              <a:rPr lang="en-US" dirty="0"/>
+              <a:t>.</a:t>
+            </a:r>
+          </a:p>
+        </p:txBody>
+      </p:sp>
+      <p:sp>
+        <p:nvSpPr>
+          <p:cNvPr id="3" name="Content Placeholder 2"/>
+          <p:cNvSpPr>
+            <a:spLocks noGrp="1"/>
+          </p:cNvSpPr>
+          <p:nvPr>
+            <p:ph idx="1"/>
+          </p:nvPr>
+        </p:nvSpPr>
+        <p:spPr/>
+        <p:txBody>
+          <a:bodyPr/>
+          <a:lstStyle/>
+          <a:p>
+            <a:pPr fontAlgn="base"/>
+            <a:r>
+              <a:rPr lang="en-US" dirty="0" smtClean="0"/>
+              <a:t>The </a:t>
+            </a:r>
+            <a:r>
+              <a:rPr lang="en-US" dirty="0"/>
+              <a:t>gulp-</a:t>
+            </a:r>
+            <a:r>
+              <a:rPr lang="en-US" dirty="0" err="1"/>
+              <a:t>concat</a:t>
+            </a:r>
+            <a:r>
+              <a:rPr lang="en-US" dirty="0"/>
+              <a:t> package concatenates, </a:t>
+            </a:r>
+            <a:r>
+              <a:rPr lang="en-US" dirty="0" smtClean="0"/>
+              <a:t>or combines </a:t>
+            </a:r>
+            <a:r>
+              <a:rPr lang="en-US" dirty="0"/>
+              <a:t>multiple file, into one </a:t>
+            </a:r>
+            <a:r>
+              <a:rPr lang="en-US" dirty="0" smtClean="0"/>
+              <a:t>file. This </a:t>
+            </a:r>
+            <a:r>
+              <a:rPr lang="en-US" dirty="0"/>
+              <a:t>is great for turning a bunch of CSS or JavaScript files into just one.</a:t>
+            </a:r>
+          </a:p>
+          <a:p>
+            <a:endParaRPr lang="en-US" dirty="0" smtClean="0"/>
+          </a:p>
+          <a:p>
+            <a:endParaRPr lang="en-US" dirty="0"/>
+          </a:p>
+          <a:p>
+            <a:pPr lvl="1"/>
+            <a:r>
+              <a:rPr lang="en-US" dirty="0" err="1" smtClean="0"/>
+              <a:t>npm</a:t>
+            </a:r>
+            <a:r>
+              <a:rPr lang="en-US" dirty="0" smtClean="0"/>
+              <a:t> install gulp-</a:t>
+            </a:r>
+            <a:r>
+              <a:rPr lang="en-US" dirty="0" err="1" smtClean="0"/>
+              <a:t>concat</a:t>
+            </a:r>
+            <a:r>
+              <a:rPr lang="en-US" dirty="0" smtClean="0"/>
+              <a:t> –save-</a:t>
+            </a:r>
+            <a:r>
+              <a:rPr lang="en-US" dirty="0" err="1" smtClean="0"/>
+              <a:t>dev</a:t>
+            </a:r>
+            <a:endParaRPr lang="en-US" dirty="0" smtClean="0"/>
+          </a:p>
+          <a:p>
+            <a:pPr lvl="1"/>
+            <a:endParaRPr lang="en-US" dirty="0"/>
+          </a:p>
+          <a:p>
+            <a:pPr marL="457200" lvl="1" indent="0">
+              <a:buNone/>
+            </a:pPr>
+            <a:endParaRPr lang="en-US" dirty="0"/>
+          </a:p>
+        </p:txBody>
+      </p:sp>
+    </p:spTree>
+    <p:extLst>
+      <p:ext uri="{BB962C8B-B14F-4D97-AF65-F5344CB8AC3E}">
+        <p14:creationId xmlns:p14="http://schemas.microsoft.com/office/powerpoint/2010/main" val="307156273"/>
+      </p:ext>
+    </p:extLst>
+  </p:cSld>
+  <p:clrMapOvr>
+    <a:masterClrMapping/>
+  </p:clrMapOvr>
+</p:sld>
+</file>
+
+<file path=ppt/slides/slide12.xml><?xml version="1.0" encoding="utf-8"?>
+<p:sld xmlns:a="http://schemas.openxmlformats.org/drawingml/2006/main" xmlns:r="http://schemas.openxmlformats.org/officeDocument/2006/relationships" xmlns:p="http://schemas.openxmlformats.org/presentationml/2006/main">
+  <p:cSld>
+    <p:spTree>
+      <p:nvGrpSpPr>
+        <p:cNvPr id="1" name=""/>
+        <p:cNvGrpSpPr/>
+        <p:nvPr/>
+      </p:nvGrpSpPr>
+      <p:grpSpPr>
+        <a:xfrm>
+          <a:off x="0" y="0"/>
+          <a:ext cx="0" cy="0"/>
+          <a:chOff x="0" y="0"/>
+          <a:chExt cx="0" cy="0"/>
+        </a:xfrm>
+      </p:grpSpPr>
+      <p:sp>
+        <p:nvSpPr>
+          <p:cNvPr id="2" name="Title 1"/>
+          <p:cNvSpPr>
+            <a:spLocks noGrp="1"/>
+          </p:cNvSpPr>
+          <p:nvPr>
+            <p:ph type="title"/>
+          </p:nvPr>
+        </p:nvSpPr>
+        <p:spPr/>
+        <p:txBody>
+          <a:bodyPr/>
+          <a:lstStyle/>
+          <a:p>
+            <a:r>
+              <a:rPr lang="en-US" dirty="0" err="1" smtClean="0"/>
+              <a:t>gulp.src</a:t>
+            </a:r>
+            <a:endParaRPr lang="en-US" dirty="0"/>
+          </a:p>
+        </p:txBody>
+      </p:sp>
+      <p:sp>
+        <p:nvSpPr>
+          <p:cNvPr id="3" name="Content Placeholder 2"/>
+          <p:cNvSpPr>
+            <a:spLocks noGrp="1"/>
+          </p:cNvSpPr>
+          <p:nvPr>
+            <p:ph idx="1"/>
+          </p:nvPr>
+        </p:nvSpPr>
+        <p:spPr/>
+        <p:txBody>
+          <a:bodyPr>
+            <a:normAutofit fontScale="92500" lnSpcReduction="10000"/>
+          </a:bodyPr>
+          <a:lstStyle/>
+          <a:p>
+            <a:pPr fontAlgn="base"/>
+            <a:r>
+              <a:rPr lang="en-US" dirty="0" err="1" smtClean="0"/>
+              <a:t>gulp.src</a:t>
+            </a:r>
+            <a:r>
+              <a:rPr lang="en-US" dirty="0" smtClean="0"/>
+              <a:t> </a:t>
+            </a:r>
+            <a:r>
+              <a:rPr lang="en-US" dirty="0"/>
+              <a:t>can take an array of file names or a string of a single file.</a:t>
+            </a:r>
+          </a:p>
+          <a:p>
+            <a:pPr fontAlgn="base"/>
+            <a:endParaRPr lang="en-US" i="1" dirty="0"/>
+          </a:p>
+          <a:p>
+            <a:pPr fontAlgn="base"/>
+            <a:r>
+              <a:rPr lang="en-US" dirty="0" smtClean="0"/>
+              <a:t>Since </a:t>
+            </a:r>
+            <a:r>
+              <a:rPr lang="en-US" dirty="0"/>
+              <a:t>there are multiple files we're going to use an </a:t>
+            </a:r>
+            <a:r>
+              <a:rPr lang="en-US" dirty="0" smtClean="0"/>
+              <a:t>array. And we'll </a:t>
+            </a:r>
+            <a:r>
+              <a:rPr lang="en-US" dirty="0"/>
+              <a:t>list the three files in the order that I want to concatenate them</a:t>
+            </a:r>
+            <a:r>
+              <a:rPr lang="en-US" dirty="0" smtClean="0"/>
+              <a:t>.</a:t>
+            </a:r>
+          </a:p>
+          <a:p>
+            <a:pPr fontAlgn="base"/>
+            <a:endParaRPr lang="en-US" dirty="0"/>
+          </a:p>
+          <a:p>
+            <a:pPr fontAlgn="base"/>
+            <a:r>
+              <a:rPr lang="en-US" dirty="0"/>
+              <a:t>Now sometimes the load order of the scripts does not matter, </a:t>
+            </a:r>
+            <a:r>
+              <a:rPr lang="en-US" dirty="0" smtClean="0"/>
+              <a:t>and in </a:t>
+            </a:r>
+            <a:r>
+              <a:rPr lang="en-US" dirty="0"/>
+              <a:t>this case it does</a:t>
+            </a:r>
+            <a:r>
+              <a:rPr lang="en-US" dirty="0" smtClean="0"/>
+              <a:t>.</a:t>
+            </a:r>
+          </a:p>
+          <a:p>
+            <a:pPr marL="0" indent="0" fontAlgn="base">
+              <a:buNone/>
+            </a:pPr>
+            <a:endParaRPr lang="en-US" dirty="0" smtClean="0"/>
+          </a:p>
+          <a:p>
+            <a:pPr fontAlgn="base"/>
+            <a:r>
+              <a:rPr lang="en-US" dirty="0"/>
+              <a:t>The </a:t>
+            </a:r>
+            <a:r>
+              <a:rPr lang="en-US" dirty="0" err="1"/>
+              <a:t>gulp.source</a:t>
+            </a:r>
+            <a:r>
+              <a:rPr lang="en-US" dirty="0"/>
+              <a:t> method works by creating what's called a readable stream of </a:t>
+            </a:r>
+            <a:r>
+              <a:rPr lang="en-US" dirty="0" smtClean="0"/>
+              <a:t>data. This </a:t>
+            </a:r>
+            <a:r>
+              <a:rPr lang="en-US" dirty="0"/>
+              <a:t>stream is an in-memory piece of data that can be used by the application.</a:t>
+            </a:r>
+          </a:p>
+          <a:p>
+            <a:pPr fontAlgn="base"/>
+            <a:endParaRPr lang="en-US" dirty="0"/>
+          </a:p>
+          <a:p>
+            <a:endParaRPr lang="en-US" dirty="0"/>
+          </a:p>
+        </p:txBody>
+      </p:sp>
+    </p:spTree>
+    <p:extLst>
+      <p:ext uri="{BB962C8B-B14F-4D97-AF65-F5344CB8AC3E}">
+        <p14:creationId xmlns:p14="http://schemas.microsoft.com/office/powerpoint/2010/main" val="2601544668"/>
+      </p:ext>
+    </p:extLst>
+  </p:cSld>
+  <p:clrMapOvr>
+    <a:masterClrMapping/>
+  </p:clrMapOvr>
+</p:sld>
+</file>
+
+<file path=ppt/slides/slide13.xml><?xml version="1.0" encoding="utf-8"?>
+<p:sld xmlns:a="http://schemas.openxmlformats.org/drawingml/2006/main" xmlns:r="http://schemas.openxmlformats.org/officeDocument/2006/relationships" xmlns:p="http://schemas.openxmlformats.org/presentationml/2006/main">
+  <p:cSld>
+    <p:spTree>
+      <p:nvGrpSpPr>
+        <p:cNvPr id="1" name=""/>
+        <p:cNvGrpSpPr/>
+        <p:nvPr/>
+      </p:nvGrpSpPr>
+      <p:grpSpPr>
+        <a:xfrm>
+          <a:off x="0" y="0"/>
+          <a:ext cx="0" cy="0"/>
+          <a:chOff x="0" y="0"/>
+          <a:chExt cx="0" cy="0"/>
+        </a:xfrm>
+      </p:grpSpPr>
+      <p:sp>
+        <p:nvSpPr>
+          <p:cNvPr id="2" name="Title 1"/>
+          <p:cNvSpPr>
+            <a:spLocks noGrp="1"/>
+          </p:cNvSpPr>
+          <p:nvPr>
+            <p:ph type="title"/>
+          </p:nvPr>
+        </p:nvSpPr>
+        <p:spPr/>
+        <p:txBody>
+          <a:bodyPr/>
+          <a:lstStyle/>
+          <a:p>
+            <a:r>
+              <a:rPr lang="en-US" dirty="0" smtClean="0"/>
+              <a:t>.pipe </a:t>
+            </a:r>
+            <a:endParaRPr lang="en-US" dirty="0"/>
+          </a:p>
+        </p:txBody>
+      </p:sp>
+      <p:sp>
+        <p:nvSpPr>
+          <p:cNvPr id="3" name="Content Placeholder 2"/>
+          <p:cNvSpPr>
+            <a:spLocks noGrp="1"/>
+          </p:cNvSpPr>
+          <p:nvPr>
+            <p:ph idx="1"/>
+          </p:nvPr>
+        </p:nvSpPr>
+        <p:spPr/>
+        <p:txBody>
+          <a:bodyPr/>
+          <a:lstStyle/>
+          <a:p>
+            <a:pPr fontAlgn="base"/>
+            <a:r>
+              <a:rPr lang="en-US" dirty="0" smtClean="0"/>
+              <a:t>pipe() sends </a:t>
+            </a:r>
+            <a:r>
+              <a:rPr lang="en-US" dirty="0"/>
+              <a:t>the readable stream of data to our </a:t>
+            </a:r>
+            <a:r>
+              <a:rPr lang="en-US" dirty="0" err="1"/>
+              <a:t>concat</a:t>
+            </a:r>
+            <a:r>
+              <a:rPr lang="en-US" dirty="0"/>
+              <a:t> task</a:t>
+            </a:r>
+            <a:r>
+              <a:rPr lang="en-US" dirty="0" smtClean="0"/>
+              <a:t>.</a:t>
+            </a:r>
+          </a:p>
+          <a:p>
+            <a:pPr fontAlgn="base"/>
+            <a:endParaRPr lang="en-US" dirty="0" smtClean="0"/>
+          </a:p>
+          <a:p>
+            <a:pPr fontAlgn="base"/>
+            <a:r>
+              <a:rPr lang="en-US" dirty="0" smtClean="0"/>
+              <a:t>The </a:t>
+            </a:r>
+            <a:r>
+              <a:rPr lang="en-US" dirty="0" err="1"/>
+              <a:t>concat</a:t>
+            </a:r>
+            <a:r>
+              <a:rPr lang="en-US" dirty="0"/>
+              <a:t> task takes a string </a:t>
+            </a:r>
+            <a:r>
+              <a:rPr lang="en-US" dirty="0" smtClean="0"/>
+              <a:t>parameter, which </a:t>
+            </a:r>
+            <a:r>
+              <a:rPr lang="en-US" dirty="0"/>
+              <a:t>will be the name of the file we </a:t>
+            </a:r>
+            <a:r>
+              <a:rPr lang="en-US" dirty="0" smtClean="0"/>
+              <a:t>create. In </a:t>
+            </a:r>
+            <a:r>
+              <a:rPr lang="en-US" dirty="0"/>
+              <a:t>our case, this is going to be app.js.</a:t>
+            </a:r>
+          </a:p>
+          <a:p>
+            <a:pPr fontAlgn="base"/>
+            <a:endParaRPr lang="en-US" dirty="0"/>
+          </a:p>
+          <a:p>
+            <a:endParaRPr lang="en-US" dirty="0"/>
+          </a:p>
+        </p:txBody>
+      </p:sp>
+    </p:spTree>
+    <p:extLst>
+      <p:ext uri="{BB962C8B-B14F-4D97-AF65-F5344CB8AC3E}">
+        <p14:creationId xmlns:p14="http://schemas.microsoft.com/office/powerpoint/2010/main" val="3185629231"/>
+      </p:ext>
+    </p:extLst>
+  </p:cSld>
+  <p:clrMapOvr>
+    <a:masterClrMapping/>
+  </p:clrMapOvr>
+</p:sld>
+</file>
+
+<file path=ppt/slides/slide14.xml><?xml version="1.0" encoding="utf-8"?>
+<p:sld xmlns:a="http://schemas.openxmlformats.org/drawingml/2006/main" xmlns:r="http://schemas.openxmlformats.org/officeDocument/2006/relationships" xmlns:p="http://schemas.openxmlformats.org/presentationml/2006/main">
+  <p:cSld>
+    <p:spTree>
+      <p:nvGrpSpPr>
+        <p:cNvPr id="1" name=""/>
+        <p:cNvGrpSpPr/>
+        <p:nvPr/>
+      </p:nvGrpSpPr>
+      <p:grpSpPr>
+        <a:xfrm>
+          <a:off x="0" y="0"/>
+          <a:ext cx="0" cy="0"/>
+          <a:chOff x="0" y="0"/>
+          <a:chExt cx="0" cy="0"/>
+        </a:xfrm>
+      </p:grpSpPr>
+      <p:sp>
+        <p:nvSpPr>
+          <p:cNvPr id="2" name="Title 1"/>
+          <p:cNvSpPr>
+            <a:spLocks noGrp="1"/>
+          </p:cNvSpPr>
+          <p:nvPr>
+            <p:ph type="title"/>
+          </p:nvPr>
+        </p:nvSpPr>
+        <p:spPr/>
+        <p:txBody>
+          <a:bodyPr/>
+          <a:lstStyle/>
+          <a:p>
+            <a:r>
+              <a:rPr lang="en-US" dirty="0" err="1" smtClean="0"/>
+              <a:t>gulp.dest</a:t>
+            </a:r>
+            <a:endParaRPr lang="en-US" dirty="0"/>
+          </a:p>
+        </p:txBody>
+      </p:sp>
+      <p:sp>
+        <p:nvSpPr>
+          <p:cNvPr id="3" name="Content Placeholder 2"/>
+          <p:cNvSpPr>
+            <a:spLocks noGrp="1"/>
+          </p:cNvSpPr>
+          <p:nvPr>
+            <p:ph idx="1"/>
+          </p:nvPr>
+        </p:nvSpPr>
+        <p:spPr/>
+        <p:txBody>
+          <a:bodyPr>
+            <a:normAutofit lnSpcReduction="10000"/>
+          </a:bodyPr>
+          <a:lstStyle/>
+          <a:p>
+            <a:pPr fontAlgn="base"/>
+            <a:r>
+              <a:rPr lang="en-US" dirty="0"/>
+              <a:t>Now finally, I will pipe that file to its destination using the </a:t>
+            </a:r>
+            <a:r>
+              <a:rPr lang="en-US" dirty="0" err="1"/>
+              <a:t>gulp.dest</a:t>
+            </a:r>
+            <a:r>
+              <a:rPr lang="en-US" dirty="0"/>
+              <a:t> </a:t>
+            </a:r>
+            <a:r>
+              <a:rPr lang="en-US" dirty="0" smtClean="0"/>
+              <a:t>method. </a:t>
+            </a:r>
+          </a:p>
+          <a:p>
+            <a:pPr fontAlgn="base"/>
+            <a:endParaRPr lang="en-US" dirty="0"/>
+          </a:p>
+          <a:p>
+            <a:pPr fontAlgn="base"/>
+            <a:r>
+              <a:rPr lang="en-US" dirty="0" smtClean="0"/>
+              <a:t>The </a:t>
+            </a:r>
+            <a:r>
+              <a:rPr lang="en-US" dirty="0" err="1"/>
+              <a:t>gulp.dest</a:t>
+            </a:r>
+            <a:r>
+              <a:rPr lang="en-US" dirty="0"/>
+              <a:t> method is the one that takes a readable stream of data </a:t>
+            </a:r>
+            <a:r>
+              <a:rPr lang="en-US" dirty="0" smtClean="0"/>
+              <a:t>and actually </a:t>
+            </a:r>
+            <a:r>
+              <a:rPr lang="en-US" dirty="0"/>
+              <a:t>persists it, or writes it, to disk</a:t>
+            </a:r>
+            <a:r>
+              <a:rPr lang="en-US" dirty="0" smtClean="0"/>
+              <a:t>.</a:t>
+            </a:r>
+          </a:p>
+          <a:p>
+            <a:pPr fontAlgn="base"/>
+            <a:endParaRPr lang="en-US" dirty="0"/>
+          </a:p>
+          <a:p>
+            <a:pPr fontAlgn="base"/>
+            <a:r>
+              <a:rPr lang="en-US" dirty="0"/>
+              <a:t>In this case, we'll give the </a:t>
+            </a:r>
+            <a:r>
+              <a:rPr lang="en-US" dirty="0" err="1"/>
+              <a:t>gulp.dest</a:t>
+            </a:r>
+            <a:r>
+              <a:rPr lang="en-US" dirty="0"/>
+              <a:t> method a </a:t>
+            </a:r>
+            <a:r>
+              <a:rPr lang="en-US" dirty="0">
+                <a:solidFill>
+                  <a:srgbClr val="00B050"/>
+                </a:solidFill>
+              </a:rPr>
+              <a:t>string </a:t>
+            </a:r>
+            <a:r>
+              <a:rPr lang="en-US" dirty="0" smtClean="0">
+                <a:solidFill>
+                  <a:srgbClr val="00B050"/>
+                </a:solidFill>
+              </a:rPr>
+              <a:t>parameter</a:t>
+            </a:r>
+            <a:r>
+              <a:rPr lang="en-US" dirty="0" smtClean="0"/>
+              <a:t>. This </a:t>
+            </a:r>
+            <a:r>
+              <a:rPr lang="en-US" dirty="0"/>
+              <a:t>will be </a:t>
+            </a:r>
+            <a:r>
+              <a:rPr lang="en-US" dirty="0">
+                <a:solidFill>
+                  <a:srgbClr val="00B050"/>
+                </a:solidFill>
+              </a:rPr>
+              <a:t>the folder </a:t>
+            </a:r>
+            <a:r>
+              <a:rPr lang="en-US" dirty="0"/>
+              <a:t>that we want the result of our </a:t>
+            </a:r>
+            <a:r>
+              <a:rPr lang="en-US" dirty="0" err="1"/>
+              <a:t>concat</a:t>
+            </a:r>
+            <a:r>
+              <a:rPr lang="en-US" dirty="0"/>
+              <a:t> task to end up </a:t>
+            </a:r>
+            <a:r>
+              <a:rPr lang="en-US" dirty="0" smtClean="0"/>
+              <a:t>in. Since </a:t>
+            </a:r>
+            <a:r>
+              <a:rPr lang="en-US" dirty="0"/>
+              <a:t>we </a:t>
+            </a:r>
+            <a:r>
+              <a:rPr lang="en-US" dirty="0">
+                <a:solidFill>
+                  <a:srgbClr val="00B050"/>
+                </a:solidFill>
+              </a:rPr>
+              <a:t>want the file in the JS folder</a:t>
+            </a:r>
+            <a:r>
+              <a:rPr lang="en-US" dirty="0"/>
+              <a:t>, I'll provide that as the parameter.</a:t>
+            </a:r>
+          </a:p>
+          <a:p>
+            <a:pPr fontAlgn="base"/>
+            <a:endParaRPr lang="en-US" dirty="0"/>
+          </a:p>
+          <a:p>
+            <a:endParaRPr lang="en-US" dirty="0"/>
+          </a:p>
+        </p:txBody>
+      </p:sp>
+    </p:spTree>
+    <p:extLst>
+      <p:ext uri="{BB962C8B-B14F-4D97-AF65-F5344CB8AC3E}">
+        <p14:creationId xmlns:p14="http://schemas.microsoft.com/office/powerpoint/2010/main" val="620630333"/>
+      </p:ext>
+    </p:extLst>
+  </p:cSld>
+  <p:clrMapOvr>
+    <a:masterClrMapping/>
+  </p:clrMapOvr>
+</p:sld>
+</file>
+
 <file path=ppt/slides/slide2.xml><?xml version="1.0" encoding="utf-8"?>
 <p:sld xmlns:a="http://schemas.openxmlformats.org/drawingml/2006/main" xmlns:r="http://schemas.openxmlformats.org/officeDocument/2006/relationships" xmlns:p="http://schemas.openxmlformats.org/presentationml/2006/main">
   <p:cSld>
@@ -4561,13 +5491,9 @@
           <a:p>
             <a:r>
               <a:rPr lang="en-US" dirty="0" smtClean="0"/>
-              <a:t>Installing </a:t>
-            </a:r>
-            <a:r>
-              <a:rPr lang="en-US" smtClean="0"/>
-              <a:t>Gulp Globally</a:t>
-            </a:r>
-            <a:endParaRPr lang="en-US"/>
+              <a:t>Installing Gulp Globally</a:t>
+            </a:r>
+            <a:endParaRPr lang="en-US" dirty="0"/>
           </a:p>
         </p:txBody>
       </p:sp>
@@ -4640,6 +5566,344 @@
     <p:extLst>
       <p:ext uri="{BB962C8B-B14F-4D97-AF65-F5344CB8AC3E}">
         <p14:creationId xmlns:p14="http://schemas.microsoft.com/office/powerpoint/2010/main" val="1061683903"/>
+      </p:ext>
+    </p:extLst>
+  </p:cSld>
+  <p:clrMapOvr>
+    <a:masterClrMapping/>
+  </p:clrMapOvr>
+</p:sld>
+</file>
+
+<file path=ppt/slides/slide8.xml><?xml version="1.0" encoding="utf-8"?>
+<p:sld xmlns:a="http://schemas.openxmlformats.org/drawingml/2006/main" xmlns:r="http://schemas.openxmlformats.org/officeDocument/2006/relationships" xmlns:p="http://schemas.openxmlformats.org/presentationml/2006/main">
+  <p:cSld>
+    <p:spTree>
+      <p:nvGrpSpPr>
+        <p:cNvPr id="1" name=""/>
+        <p:cNvGrpSpPr/>
+        <p:nvPr/>
+      </p:nvGrpSpPr>
+      <p:grpSpPr>
+        <a:xfrm>
+          <a:off x="0" y="0"/>
+          <a:ext cx="0" cy="0"/>
+          <a:chOff x="0" y="0"/>
+          <a:chExt cx="0" cy="0"/>
+        </a:xfrm>
+      </p:grpSpPr>
+      <p:sp>
+        <p:nvSpPr>
+          <p:cNvPr id="2" name="Title 1"/>
+          <p:cNvSpPr>
+            <a:spLocks noGrp="1"/>
+          </p:cNvSpPr>
+          <p:nvPr>
+            <p:ph type="title"/>
+          </p:nvPr>
+        </p:nvSpPr>
+        <p:spPr/>
+        <p:txBody>
+          <a:bodyPr/>
+          <a:lstStyle/>
+          <a:p>
+            <a:r>
+              <a:rPr lang="en-US" dirty="0"/>
+              <a:t>Your First Gulp </a:t>
+            </a:r>
+            <a:r>
+              <a:rPr lang="en-US" dirty="0" smtClean="0"/>
+              <a:t>Task</a:t>
+            </a:r>
+            <a:endParaRPr lang="en-US" dirty="0"/>
+          </a:p>
+        </p:txBody>
+      </p:sp>
+      <p:sp>
+        <p:nvSpPr>
+          <p:cNvPr id="3" name="Content Placeholder 2"/>
+          <p:cNvSpPr>
+            <a:spLocks noGrp="1"/>
+          </p:cNvSpPr>
+          <p:nvPr>
+            <p:ph idx="1"/>
+          </p:nvPr>
+        </p:nvSpPr>
+        <p:spPr/>
+        <p:txBody>
+          <a:bodyPr>
+            <a:normAutofit lnSpcReduction="10000"/>
+          </a:bodyPr>
+          <a:lstStyle/>
+          <a:p>
+            <a:pPr fontAlgn="base"/>
+            <a:r>
+              <a:rPr lang="en-US" dirty="0"/>
+              <a:t>L</a:t>
+            </a:r>
+            <a:r>
+              <a:rPr lang="en-US" dirty="0" smtClean="0"/>
+              <a:t>oad </a:t>
+            </a:r>
+            <a:r>
+              <a:rPr lang="en-US" dirty="0"/>
+              <a:t>the gulp module by requiring it </a:t>
+            </a:r>
+            <a:r>
+              <a:rPr lang="en-US" dirty="0" smtClean="0"/>
+              <a:t>and assigning </a:t>
+            </a:r>
+            <a:r>
+              <a:rPr lang="en-US" dirty="0"/>
+              <a:t>it to the variable </a:t>
+            </a:r>
+            <a:r>
+              <a:rPr lang="en-US" dirty="0" smtClean="0"/>
+              <a:t>gulp.</a:t>
+            </a:r>
+          </a:p>
+          <a:p>
+            <a:pPr marL="0" indent="0" fontAlgn="base">
+              <a:buNone/>
+            </a:pPr>
+            <a:r>
+              <a:rPr lang="en-US" dirty="0" smtClean="0"/>
+              <a:t>	</a:t>
+            </a:r>
+            <a:r>
+              <a:rPr lang="en-US" dirty="0" err="1" smtClean="0"/>
+              <a:t>var</a:t>
+            </a:r>
+            <a:r>
+              <a:rPr lang="en-US" dirty="0" smtClean="0"/>
+              <a:t> gulp = require (‘gulp’);</a:t>
+            </a:r>
+          </a:p>
+          <a:p>
+            <a:pPr fontAlgn="base"/>
+            <a:endParaRPr lang="en-US" dirty="0"/>
+          </a:p>
+          <a:p>
+            <a:pPr fontAlgn="base"/>
+            <a:r>
+              <a:rPr lang="en-US" dirty="0"/>
+              <a:t>The final thing that Gulp needs is for us to define a task</a:t>
+            </a:r>
+            <a:r>
+              <a:rPr lang="en-US" dirty="0" smtClean="0"/>
+              <a:t>. </a:t>
+            </a:r>
+            <a:r>
+              <a:rPr lang="en-US" dirty="0"/>
+              <a:t>To do this, we're going to use Gulp's task </a:t>
+            </a:r>
+            <a:r>
+              <a:rPr lang="en-US" dirty="0" smtClean="0"/>
+              <a:t>method.</a:t>
+            </a:r>
+          </a:p>
+          <a:p>
+            <a:pPr fontAlgn="base"/>
+            <a:endParaRPr lang="en-US" dirty="0"/>
+          </a:p>
+          <a:p>
+            <a:pPr fontAlgn="base"/>
+            <a:r>
+              <a:rPr lang="en-US" dirty="0" smtClean="0"/>
+              <a:t>The </a:t>
+            </a:r>
+            <a:r>
+              <a:rPr lang="en-US" dirty="0"/>
+              <a:t>task method will receive the name of a task as the first parameter</a:t>
+            </a:r>
+            <a:r>
+              <a:rPr lang="en-US" dirty="0" smtClean="0"/>
+              <a:t>. </a:t>
+            </a:r>
+            <a:r>
+              <a:rPr lang="en-US" dirty="0"/>
+              <a:t>And it takes an anonymous function as the second parameter.</a:t>
+            </a:r>
+          </a:p>
+          <a:p>
+            <a:pPr fontAlgn="base"/>
+            <a:endParaRPr lang="en-US" dirty="0"/>
+          </a:p>
+        </p:txBody>
+      </p:sp>
+    </p:spTree>
+    <p:extLst>
+      <p:ext uri="{BB962C8B-B14F-4D97-AF65-F5344CB8AC3E}">
+        <p14:creationId xmlns:p14="http://schemas.microsoft.com/office/powerpoint/2010/main" val="257896009"/>
+      </p:ext>
+    </p:extLst>
+  </p:cSld>
+  <p:clrMapOvr>
+    <a:masterClrMapping/>
+  </p:clrMapOvr>
+</p:sld>
+</file>
+
+<file path=ppt/slides/slide9.xml><?xml version="1.0" encoding="utf-8"?>
+<p:sld xmlns:a="http://schemas.openxmlformats.org/drawingml/2006/main" xmlns:r="http://schemas.openxmlformats.org/officeDocument/2006/relationships" xmlns:p="http://schemas.openxmlformats.org/presentationml/2006/main">
+  <p:cSld>
+    <p:spTree>
+      <p:nvGrpSpPr>
+        <p:cNvPr id="1" name=""/>
+        <p:cNvGrpSpPr/>
+        <p:nvPr/>
+      </p:nvGrpSpPr>
+      <p:grpSpPr>
+        <a:xfrm>
+          <a:off x="0" y="0"/>
+          <a:ext cx="0" cy="0"/>
+          <a:chOff x="0" y="0"/>
+          <a:chExt cx="0" cy="0"/>
+        </a:xfrm>
+      </p:grpSpPr>
+      <p:sp>
+        <p:nvSpPr>
+          <p:cNvPr id="2" name="Title 1"/>
+          <p:cNvSpPr>
+            <a:spLocks noGrp="1"/>
+          </p:cNvSpPr>
+          <p:nvPr>
+            <p:ph type="title"/>
+          </p:nvPr>
+        </p:nvSpPr>
+        <p:spPr/>
+        <p:txBody>
+          <a:bodyPr/>
+          <a:lstStyle/>
+          <a:p>
+            <a:r>
+              <a:rPr lang="en-US" dirty="0" smtClean="0"/>
+              <a:t>First Task</a:t>
+            </a:r>
+            <a:endParaRPr lang="en-US" dirty="0"/>
+          </a:p>
+        </p:txBody>
+      </p:sp>
+      <p:sp>
+        <p:nvSpPr>
+          <p:cNvPr id="3" name="Content Placeholder 2"/>
+          <p:cNvSpPr>
+            <a:spLocks noGrp="1"/>
+          </p:cNvSpPr>
+          <p:nvPr>
+            <p:ph idx="1"/>
+          </p:nvPr>
+        </p:nvSpPr>
+        <p:spPr/>
+        <p:txBody>
+          <a:bodyPr>
+            <a:normAutofit lnSpcReduction="10000"/>
+          </a:bodyPr>
+          <a:lstStyle/>
+          <a:p>
+            <a:pPr fontAlgn="base"/>
+            <a:r>
+              <a:rPr lang="en-US" dirty="0" smtClean="0"/>
+              <a:t>Instead </a:t>
+            </a:r>
+            <a:r>
+              <a:rPr lang="en-US" dirty="0"/>
+              <a:t>of providing a function as a second </a:t>
+            </a:r>
+            <a:r>
+              <a:rPr lang="en-US" dirty="0" smtClean="0"/>
+              <a:t>parameter, I'm </a:t>
+            </a:r>
+            <a:r>
+              <a:rPr lang="en-US" dirty="0"/>
+              <a:t>going to provide an </a:t>
+            </a:r>
+            <a:r>
+              <a:rPr lang="en-US" dirty="0">
+                <a:solidFill>
+                  <a:srgbClr val="00B050"/>
+                </a:solidFill>
+              </a:rPr>
+              <a:t>array of </a:t>
+            </a:r>
+            <a:r>
+              <a:rPr lang="en-US" dirty="0" smtClean="0">
+                <a:solidFill>
+                  <a:srgbClr val="00B050"/>
+                </a:solidFill>
+              </a:rPr>
+              <a:t>dependencies</a:t>
+            </a:r>
+            <a:r>
+              <a:rPr lang="en-US" dirty="0" smtClean="0"/>
+              <a:t>. Now</a:t>
+            </a:r>
+            <a:r>
+              <a:rPr lang="en-US" dirty="0"/>
+              <a:t>, we only have one other task defined so </a:t>
+            </a:r>
+            <a:r>
+              <a:rPr lang="en-US" dirty="0" smtClean="0"/>
+              <a:t>far. We're </a:t>
+            </a:r>
+            <a:r>
+              <a:rPr lang="en-US" dirty="0" err="1"/>
+              <a:t>gonna</a:t>
+            </a:r>
+            <a:r>
+              <a:rPr lang="en-US" dirty="0"/>
+              <a:t> make that task a dependency of the default task.</a:t>
+            </a:r>
+          </a:p>
+          <a:p>
+            <a:pPr marL="0" indent="0">
+              <a:buNone/>
+            </a:pPr>
+            <a:endParaRPr lang="en-US" dirty="0" smtClean="0"/>
+          </a:p>
+          <a:p>
+            <a:pPr fontAlgn="base"/>
+            <a:r>
+              <a:rPr lang="en-US" dirty="0"/>
+              <a:t>When we say dependency, what we mean is that Gulp is going to run </a:t>
+            </a:r>
+            <a:r>
+              <a:rPr lang="en-US" dirty="0" smtClean="0"/>
+              <a:t>every dependency </a:t>
+            </a:r>
+            <a:r>
+              <a:rPr lang="en-US" dirty="0"/>
+              <a:t>before it starts running the default </a:t>
+            </a:r>
+            <a:r>
+              <a:rPr lang="en-US" dirty="0" smtClean="0"/>
+              <a:t>task. </a:t>
+            </a:r>
+          </a:p>
+          <a:p>
+            <a:pPr fontAlgn="base"/>
+            <a:endParaRPr lang="en-US" dirty="0"/>
+          </a:p>
+          <a:p>
+            <a:pPr fontAlgn="base"/>
+            <a:r>
+              <a:rPr lang="en-US" dirty="0" smtClean="0"/>
+              <a:t>And </a:t>
+            </a:r>
+            <a:r>
+              <a:rPr lang="en-US" dirty="0"/>
+              <a:t>now for the work of our default task, we'll add another callback function,</a:t>
+            </a:r>
+          </a:p>
+          <a:p>
+            <a:endParaRPr lang="en-US" dirty="0"/>
+          </a:p>
+        </p:txBody>
+      </p:sp>
+    </p:spTree>
+    <p:extLst>
+      <p:ext uri="{BB962C8B-B14F-4D97-AF65-F5344CB8AC3E}">
+        <p14:creationId xmlns:p14="http://schemas.microsoft.com/office/powerpoint/2010/main" val="949328673"/>
       </p:ext>
     </p:extLst>
   </p:cSld>

</xml_diff>

<commit_message>
Minified the js file and renamed the file on the fly using gulp-rename package
</commit_message>
<xml_diff>
--- a/Gulp Basics.pptx
+++ b/Gulp Basics.pptx
@@ -5,7 +5,7 @@
     <p:sldMasterId id="2147483648" r:id="rId1"/>
   </p:sldMasterIdLst>
   <p:notesMasterIdLst>
-    <p:notesMasterId r:id="rId16"/>
+    <p:notesMasterId r:id="rId17"/>
   </p:notesMasterIdLst>
   <p:sldIdLst>
     <p:sldId id="256" r:id="rId2"/>
@@ -22,6 +22,7 @@
     <p:sldId id="267" r:id="rId13"/>
     <p:sldId id="268" r:id="rId14"/>
     <p:sldId id="269" r:id="rId15"/>
+    <p:sldId id="270" r:id="rId16"/>
   </p:sldIdLst>
   <p:sldSz cx="12192000" cy="6858000"/>
   <p:notesSz cx="6858000" cy="9144000"/>
@@ -120,6 +121,11 @@
       </a:defRPr>
     </a:lvl9pPr>
   </p:defaultTextStyle>
+  <p:extLst>
+    <p:ext uri="{EFAFB233-063F-42B5-8137-9DF3F51BA10A}">
+      <p15:sldGuideLst xmlns:p15="http://schemas.microsoft.com/office/powerpoint/2012/main"/>
+    </p:ext>
+  </p:extLst>
 </p:presentation>
 </file>
 
@@ -4718,6 +4724,217 @@
     <p:extLst>
       <p:ext uri="{BB962C8B-B14F-4D97-AF65-F5344CB8AC3E}">
         <p14:creationId xmlns:p14="http://schemas.microsoft.com/office/powerpoint/2010/main" val="620630333"/>
+      </p:ext>
+    </p:extLst>
+  </p:cSld>
+  <p:clrMapOvr>
+    <a:masterClrMapping/>
+  </p:clrMapOvr>
+</p:sld>
+</file>
+
+<file path=ppt/slides/slide15.xml><?xml version="1.0" encoding="utf-8"?>
+<p:sld xmlns:a="http://schemas.openxmlformats.org/drawingml/2006/main" xmlns:r="http://schemas.openxmlformats.org/officeDocument/2006/relationships" xmlns:p="http://schemas.openxmlformats.org/presentationml/2006/main">
+  <p:cSld>
+    <p:spTree>
+      <p:nvGrpSpPr>
+        <p:cNvPr id="1" name=""/>
+        <p:cNvGrpSpPr/>
+        <p:nvPr/>
+      </p:nvGrpSpPr>
+      <p:grpSpPr>
+        <a:xfrm>
+          <a:off x="0" y="0"/>
+          <a:ext cx="0" cy="0"/>
+          <a:chOff x="0" y="0"/>
+          <a:chExt cx="0" cy="0"/>
+        </a:xfrm>
+      </p:grpSpPr>
+      <p:sp>
+        <p:nvSpPr>
+          <p:cNvPr id="2" name="Title 1"/>
+          <p:cNvSpPr>
+            <a:spLocks noGrp="1"/>
+          </p:cNvSpPr>
+          <p:nvPr>
+            <p:ph type="title"/>
+          </p:nvPr>
+        </p:nvSpPr>
+        <p:spPr/>
+        <p:txBody>
+          <a:bodyPr/>
+          <a:lstStyle/>
+          <a:p>
+            <a:r>
+              <a:rPr lang="en-US" dirty="0"/>
+              <a:t>Minifying JavaScript </a:t>
+            </a:r>
+            <a:r>
+              <a:rPr lang="en-US" dirty="0" smtClean="0"/>
+              <a:t>Files</a:t>
+            </a:r>
+            <a:endParaRPr lang="en-US" dirty="0"/>
+          </a:p>
+        </p:txBody>
+      </p:sp>
+      <p:sp>
+        <p:nvSpPr>
+          <p:cNvPr id="3" name="Content Placeholder 2"/>
+          <p:cNvSpPr>
+            <a:spLocks noGrp="1"/>
+          </p:cNvSpPr>
+          <p:nvPr>
+            <p:ph idx="1"/>
+          </p:nvPr>
+        </p:nvSpPr>
+        <p:spPr/>
+        <p:txBody>
+          <a:bodyPr>
+            <a:normAutofit lnSpcReduction="10000"/>
+          </a:bodyPr>
+          <a:lstStyle/>
+          <a:p>
+            <a:pPr fontAlgn="base"/>
+            <a:r>
+              <a:rPr lang="en-US" dirty="0" err="1"/>
+              <a:t>Minification</a:t>
+            </a:r>
+            <a:r>
+              <a:rPr lang="en-US" dirty="0"/>
+              <a:t> is the process that compresses your JavaScript </a:t>
+            </a:r>
+            <a:r>
+              <a:rPr lang="en-US" dirty="0" smtClean="0"/>
+              <a:t>file, eliminating </a:t>
+            </a:r>
+            <a:r>
+              <a:rPr lang="en-US" dirty="0"/>
+              <a:t>extra </a:t>
+            </a:r>
+            <a:r>
+              <a:rPr lang="en-US" dirty="0" smtClean="0"/>
+              <a:t>space. And </a:t>
+            </a:r>
+            <a:r>
+              <a:rPr lang="en-US" dirty="0"/>
+              <a:t>in some cases the </a:t>
+            </a:r>
+            <a:r>
+              <a:rPr lang="en-US" dirty="0" err="1"/>
+              <a:t>minification</a:t>
+            </a:r>
+            <a:r>
+              <a:rPr lang="en-US" dirty="0"/>
+              <a:t> process even renames </a:t>
+            </a:r>
+            <a:r>
+              <a:rPr lang="en-US" dirty="0" smtClean="0"/>
+              <a:t>variables to </a:t>
+            </a:r>
+            <a:r>
+              <a:rPr lang="en-US" dirty="0"/>
+              <a:t>make the code more </a:t>
+            </a:r>
+            <a:r>
+              <a:rPr lang="en-US" dirty="0" err="1"/>
+              <a:t>performant</a:t>
+            </a:r>
+            <a:r>
+              <a:rPr lang="en-US" dirty="0"/>
+              <a:t>.</a:t>
+            </a:r>
+          </a:p>
+          <a:p>
+            <a:pPr fontAlgn="base"/>
+            <a:endParaRPr lang="en-US" dirty="0" smtClean="0"/>
+          </a:p>
+          <a:p>
+            <a:pPr fontAlgn="base"/>
+            <a:r>
+              <a:rPr lang="en-US" dirty="0" smtClean="0"/>
+              <a:t>These </a:t>
+            </a:r>
+            <a:r>
+              <a:rPr lang="en-US" dirty="0"/>
+              <a:t>performance improvements can reduce bandwidth used by your site </a:t>
+            </a:r>
+            <a:r>
+              <a:rPr lang="en-US" dirty="0" smtClean="0"/>
+              <a:t>and improve </a:t>
+            </a:r>
+            <a:r>
+              <a:rPr lang="en-US" dirty="0"/>
+              <a:t>the overall user experience through quicker downloads </a:t>
+            </a:r>
+            <a:r>
+              <a:rPr lang="en-US" dirty="0" smtClean="0"/>
+              <a:t>and an </a:t>
+            </a:r>
+            <a:r>
+              <a:rPr lang="en-US" dirty="0"/>
+              <a:t>overall faster application</a:t>
+            </a:r>
+            <a:r>
+              <a:rPr lang="en-US" dirty="0" smtClean="0"/>
+              <a:t>.</a:t>
+            </a:r>
+          </a:p>
+          <a:p>
+            <a:pPr fontAlgn="base"/>
+            <a:endParaRPr lang="en-US" dirty="0"/>
+          </a:p>
+          <a:p>
+            <a:pPr fontAlgn="base"/>
+            <a:r>
+              <a:rPr lang="en-US" dirty="0" smtClean="0"/>
+              <a:t>In </a:t>
+            </a:r>
+            <a:r>
+              <a:rPr lang="en-US" dirty="0"/>
+              <a:t>order to have gulp minify JavaScript files we're going to </a:t>
+            </a:r>
+            <a:r>
+              <a:rPr lang="en-US" dirty="0" smtClean="0"/>
+              <a:t>install another </a:t>
+            </a:r>
+            <a:r>
+              <a:rPr lang="en-US" dirty="0"/>
+              <a:t>third party gulp module called </a:t>
+            </a:r>
+            <a:r>
+              <a:rPr lang="en-US" dirty="0">
+                <a:solidFill>
+                  <a:srgbClr val="00B050"/>
+                </a:solidFill>
+              </a:rPr>
+              <a:t>gulp-</a:t>
+            </a:r>
+            <a:r>
+              <a:rPr lang="en-US" dirty="0" err="1">
+                <a:solidFill>
+                  <a:srgbClr val="00B050"/>
+                </a:solidFill>
+              </a:rPr>
+              <a:t>uglify</a:t>
+            </a:r>
+            <a:r>
+              <a:rPr lang="en-US" dirty="0"/>
+              <a:t>.</a:t>
+            </a:r>
+          </a:p>
+          <a:p>
+            <a:pPr fontAlgn="base"/>
+            <a:endParaRPr lang="en-US" dirty="0"/>
+          </a:p>
+          <a:p>
+            <a:endParaRPr lang="en-US" dirty="0"/>
+          </a:p>
+        </p:txBody>
+      </p:sp>
+    </p:spTree>
+    <p:extLst>
+      <p:ext uri="{BB962C8B-B14F-4D97-AF65-F5344CB8AC3E}">
+        <p14:creationId xmlns:p14="http://schemas.microsoft.com/office/powerpoint/2010/main" val="2881909255"/>
       </p:ext>
     </p:extLst>
   </p:cSld>

</xml_diff>

<commit_message>
Added dist folder using build task of gulpfile.js
</commit_message>
<xml_diff>
--- a/Gulp Basics.pptx
+++ b/Gulp Basics.pptx
@@ -5,7 +5,7 @@
     <p:sldMasterId id="2147483648" r:id="rId1"/>
   </p:sldMasterIdLst>
   <p:notesMasterIdLst>
-    <p:notesMasterId r:id="rId17"/>
+    <p:notesMasterId r:id="rId25"/>
   </p:notesMasterIdLst>
   <p:sldIdLst>
     <p:sldId id="256" r:id="rId2"/>
@@ -23,6 +23,14 @@
     <p:sldId id="268" r:id="rId14"/>
     <p:sldId id="269" r:id="rId15"/>
     <p:sldId id="270" r:id="rId16"/>
+    <p:sldId id="271" r:id="rId17"/>
+    <p:sldId id="272" r:id="rId18"/>
+    <p:sldId id="273" r:id="rId19"/>
+    <p:sldId id="274" r:id="rId20"/>
+    <p:sldId id="275" r:id="rId21"/>
+    <p:sldId id="276" r:id="rId22"/>
+    <p:sldId id="277" r:id="rId23"/>
+    <p:sldId id="278" r:id="rId24"/>
   </p:sldIdLst>
   <p:sldSz cx="12192000" cy="6858000"/>
   <p:notesSz cx="6858000" cy="9144000"/>
@@ -211,7 +219,7 @@
           <a:p>
             <a:fld id="{574AE769-5600-4CEB-9FA4-A026305BDABD}" type="datetimeFigureOut">
               <a:rPr lang="en-US" smtClean="0"/>
-              <a:t>11/7/2018</a:t>
+              <a:t>11/8/2018</a:t>
             </a:fld>
             <a:endParaRPr lang="en-US"/>
           </a:p>
@@ -1021,6 +1029,249 @@
 </p:notes>
 </file>
 
+<file path=ppt/notesSlides/notesSlide5.xml><?xml version="1.0" encoding="utf-8"?>
+<p:notes xmlns:a="http://schemas.openxmlformats.org/drawingml/2006/main" xmlns:r="http://schemas.openxmlformats.org/officeDocument/2006/relationships" xmlns:p="http://schemas.openxmlformats.org/presentationml/2006/main">
+  <p:cSld>
+    <p:spTree>
+      <p:nvGrpSpPr>
+        <p:cNvPr id="1" name=""/>
+        <p:cNvGrpSpPr/>
+        <p:nvPr/>
+      </p:nvGrpSpPr>
+      <p:grpSpPr>
+        <a:xfrm>
+          <a:off x="0" y="0"/>
+          <a:ext cx="0" cy="0"/>
+          <a:chOff x="0" y="0"/>
+          <a:chExt cx="0" cy="0"/>
+        </a:xfrm>
+      </p:grpSpPr>
+      <p:sp>
+        <p:nvSpPr>
+          <p:cNvPr id="2" name="Slide Image Placeholder 1"/>
+          <p:cNvSpPr>
+            <a:spLocks noGrp="1" noRot="1" noChangeAspect="1"/>
+          </p:cNvSpPr>
+          <p:nvPr>
+            <p:ph type="sldImg"/>
+          </p:nvPr>
+        </p:nvSpPr>
+        <p:spPr/>
+      </p:sp>
+      <p:sp>
+        <p:nvSpPr>
+          <p:cNvPr id="3" name="Notes Placeholder 2"/>
+          <p:cNvSpPr>
+            <a:spLocks noGrp="1"/>
+          </p:cNvSpPr>
+          <p:nvPr>
+            <p:ph type="body" idx="1"/>
+          </p:nvPr>
+        </p:nvSpPr>
+        <p:spPr/>
+        <p:txBody>
+          <a:bodyPr/>
+          <a:lstStyle/>
+          <a:p>
+            <a:r>
+              <a:rPr lang="en-US" sz="1200" b="0" i="0" kern="1200" dirty="0" smtClean="0">
+                <a:solidFill>
+                  <a:schemeClr val="tx1"/>
+                </a:solidFill>
+                <a:effectLst/>
+                <a:latin typeface="+mn-lt"/>
+                <a:ea typeface="+mn-ea"/>
+                <a:cs typeface="+mn-cs"/>
+              </a:rPr>
+              <a:t>And just to reiterate, this path is going to be relative to our output directory.</a:t>
+            </a:r>
+            <a:endParaRPr lang="en-US" dirty="0"/>
+          </a:p>
+        </p:txBody>
+      </p:sp>
+      <p:sp>
+        <p:nvSpPr>
+          <p:cNvPr id="4" name="Slide Number Placeholder 3"/>
+          <p:cNvSpPr>
+            <a:spLocks noGrp="1"/>
+          </p:cNvSpPr>
+          <p:nvPr>
+            <p:ph type="sldNum" sz="quarter" idx="10"/>
+          </p:nvPr>
+        </p:nvSpPr>
+        <p:spPr/>
+        <p:txBody>
+          <a:bodyPr/>
+          <a:lstStyle/>
+          <a:p>
+            <a:fld id="{1C158C89-918F-4DDB-B390-802C7B3EF181}" type="slidenum">
+              <a:rPr lang="en-US" smtClean="0"/>
+              <a:t>18</a:t>
+            </a:fld>
+            <a:endParaRPr lang="en-US"/>
+          </a:p>
+        </p:txBody>
+      </p:sp>
+    </p:spTree>
+    <p:extLst>
+      <p:ext uri="{BB962C8B-B14F-4D97-AF65-F5344CB8AC3E}">
+        <p14:creationId xmlns:p14="http://schemas.microsoft.com/office/powerpoint/2010/main" val="1586720892"/>
+      </p:ext>
+    </p:extLst>
+  </p:cSld>
+  <p:clrMapOvr>
+    <a:masterClrMapping/>
+  </p:clrMapOvr>
+</p:notes>
+</file>
+
+<file path=ppt/notesSlides/notesSlide6.xml><?xml version="1.0" encoding="utf-8"?>
+<p:notes xmlns:a="http://schemas.openxmlformats.org/drawingml/2006/main" xmlns:r="http://schemas.openxmlformats.org/officeDocument/2006/relationships" xmlns:p="http://schemas.openxmlformats.org/presentationml/2006/main">
+  <p:cSld>
+    <p:spTree>
+      <p:nvGrpSpPr>
+        <p:cNvPr id="1" name=""/>
+        <p:cNvGrpSpPr/>
+        <p:nvPr/>
+      </p:nvGrpSpPr>
+      <p:grpSpPr>
+        <a:xfrm>
+          <a:off x="0" y="0"/>
+          <a:ext cx="0" cy="0"/>
+          <a:chOff x="0" y="0"/>
+          <a:chExt cx="0" cy="0"/>
+        </a:xfrm>
+      </p:grpSpPr>
+      <p:sp>
+        <p:nvSpPr>
+          <p:cNvPr id="2" name="Slide Image Placeholder 1"/>
+          <p:cNvSpPr>
+            <a:spLocks noGrp="1" noRot="1" noChangeAspect="1"/>
+          </p:cNvSpPr>
+          <p:nvPr>
+            <p:ph type="sldImg"/>
+          </p:nvPr>
+        </p:nvSpPr>
+        <p:spPr/>
+      </p:sp>
+      <p:sp>
+        <p:nvSpPr>
+          <p:cNvPr id="3" name="Notes Placeholder 2"/>
+          <p:cNvSpPr>
+            <a:spLocks noGrp="1"/>
+          </p:cNvSpPr>
+          <p:nvPr>
+            <p:ph type="body" idx="1"/>
+          </p:nvPr>
+        </p:nvSpPr>
+        <p:spPr/>
+        <p:txBody>
+          <a:bodyPr/>
+          <a:lstStyle/>
+          <a:p>
+            <a:pPr fontAlgn="base"/>
+            <a:r>
+              <a:rPr lang="en-US" sz="1200" b="0" i="0" kern="1200" dirty="0" smtClean="0">
+                <a:solidFill>
+                  <a:schemeClr val="tx1"/>
+                </a:solidFill>
+                <a:effectLst/>
+                <a:latin typeface="+mn-lt"/>
+                <a:ea typeface="+mn-ea"/>
+                <a:cs typeface="+mn-cs"/>
+              </a:rPr>
+              <a:t>We don't need to use a return statement.</a:t>
+            </a:r>
+            <a:r>
+              <a:rPr lang="en-US" sz="1200" b="0" i="0" kern="1200" baseline="0" dirty="0" smtClean="0">
+                <a:solidFill>
+                  <a:schemeClr val="tx1"/>
+                </a:solidFill>
+                <a:effectLst/>
+                <a:latin typeface="+mn-lt"/>
+                <a:ea typeface="+mn-ea"/>
+                <a:cs typeface="+mn-cs"/>
+              </a:rPr>
+              <a:t> </a:t>
+            </a:r>
+            <a:r>
+              <a:rPr lang="en-US" sz="1200" b="0" i="0" kern="1200" dirty="0" smtClean="0">
+                <a:solidFill>
+                  <a:schemeClr val="tx1"/>
+                </a:solidFill>
+                <a:effectLst/>
+                <a:latin typeface="+mn-lt"/>
+                <a:ea typeface="+mn-ea"/>
+                <a:cs typeface="+mn-cs"/>
+              </a:rPr>
+              <a:t>Without getting too detailed about it, just remember that if other tasks</a:t>
+            </a:r>
+            <a:r>
+              <a:rPr lang="en-US" sz="1200" b="0" i="0" kern="1200" baseline="0" dirty="0" smtClean="0">
+                <a:solidFill>
+                  <a:schemeClr val="tx1"/>
+                </a:solidFill>
+                <a:effectLst/>
+                <a:latin typeface="+mn-lt"/>
+                <a:ea typeface="+mn-ea"/>
+                <a:cs typeface="+mn-cs"/>
+              </a:rPr>
+              <a:t> </a:t>
+            </a:r>
+            <a:r>
+              <a:rPr lang="en-US" sz="1200" b="0" i="0" kern="1200" dirty="0" smtClean="0">
+                <a:solidFill>
+                  <a:schemeClr val="tx1"/>
+                </a:solidFill>
+                <a:effectLst/>
+                <a:latin typeface="+mn-lt"/>
+                <a:ea typeface="+mn-ea"/>
+                <a:cs typeface="+mn-cs"/>
+              </a:rPr>
+              <a:t>don't depend on a given task, you don't need to return anything from its callback.</a:t>
+            </a:r>
+          </a:p>
+          <a:p>
+            <a:endParaRPr lang="en-US" dirty="0"/>
+          </a:p>
+        </p:txBody>
+      </p:sp>
+      <p:sp>
+        <p:nvSpPr>
+          <p:cNvPr id="4" name="Slide Number Placeholder 3"/>
+          <p:cNvSpPr>
+            <a:spLocks noGrp="1"/>
+          </p:cNvSpPr>
+          <p:nvPr>
+            <p:ph type="sldNum" sz="quarter" idx="10"/>
+          </p:nvPr>
+        </p:nvSpPr>
+        <p:spPr/>
+        <p:txBody>
+          <a:bodyPr/>
+          <a:lstStyle/>
+          <a:p>
+            <a:fld id="{1C158C89-918F-4DDB-B390-802C7B3EF181}" type="slidenum">
+              <a:rPr lang="en-US" smtClean="0"/>
+              <a:t>21</a:t>
+            </a:fld>
+            <a:endParaRPr lang="en-US"/>
+          </a:p>
+        </p:txBody>
+      </p:sp>
+    </p:spTree>
+    <p:extLst>
+      <p:ext uri="{BB962C8B-B14F-4D97-AF65-F5344CB8AC3E}">
+        <p14:creationId xmlns:p14="http://schemas.microsoft.com/office/powerpoint/2010/main" val="3851946326"/>
+      </p:ext>
+    </p:extLst>
+  </p:cSld>
+  <p:clrMapOvr>
+    <a:masterClrMapping/>
+  </p:clrMapOvr>
+</p:notes>
+</file>
+
 <file path=ppt/slideLayouts/slideLayout1.xml><?xml version="1.0" encoding="utf-8"?>
 <p:sldLayout xmlns:a="http://schemas.openxmlformats.org/drawingml/2006/main" xmlns:r="http://schemas.openxmlformats.org/officeDocument/2006/relationships" xmlns:p="http://schemas.openxmlformats.org/presentationml/2006/main" type="title" preserve="1">
   <p:cSld name="Title Slide">
@@ -1152,7 +1403,7 @@
           <a:p>
             <a:fld id="{682A4499-B1C4-408B-B1EC-AB20400A948C}" type="datetimeFigureOut">
               <a:rPr lang="en-US" smtClean="0"/>
-              <a:t>11/7/2018</a:t>
+              <a:t>11/8/2018</a:t>
             </a:fld>
             <a:endParaRPr lang="en-US"/>
           </a:p>
@@ -1322,7 +1573,7 @@
           <a:p>
             <a:fld id="{682A4499-B1C4-408B-B1EC-AB20400A948C}" type="datetimeFigureOut">
               <a:rPr lang="en-US" smtClean="0"/>
-              <a:t>11/7/2018</a:t>
+              <a:t>11/8/2018</a:t>
             </a:fld>
             <a:endParaRPr lang="en-US"/>
           </a:p>
@@ -1502,7 +1753,7 @@
           <a:p>
             <a:fld id="{682A4499-B1C4-408B-B1EC-AB20400A948C}" type="datetimeFigureOut">
               <a:rPr lang="en-US" smtClean="0"/>
-              <a:t>11/7/2018</a:t>
+              <a:t>11/8/2018</a:t>
             </a:fld>
             <a:endParaRPr lang="en-US"/>
           </a:p>
@@ -1672,7 +1923,7 @@
           <a:p>
             <a:fld id="{682A4499-B1C4-408B-B1EC-AB20400A948C}" type="datetimeFigureOut">
               <a:rPr lang="en-US" smtClean="0"/>
-              <a:t>11/7/2018</a:t>
+              <a:t>11/8/2018</a:t>
             </a:fld>
             <a:endParaRPr lang="en-US"/>
           </a:p>
@@ -1918,7 +2169,7 @@
           <a:p>
             <a:fld id="{682A4499-B1C4-408B-B1EC-AB20400A948C}" type="datetimeFigureOut">
               <a:rPr lang="en-US" smtClean="0"/>
-              <a:t>11/7/2018</a:t>
+              <a:t>11/8/2018</a:t>
             </a:fld>
             <a:endParaRPr lang="en-US"/>
           </a:p>
@@ -2150,7 +2401,7 @@
           <a:p>
             <a:fld id="{682A4499-B1C4-408B-B1EC-AB20400A948C}" type="datetimeFigureOut">
               <a:rPr lang="en-US" smtClean="0"/>
-              <a:t>11/7/2018</a:t>
+              <a:t>11/8/2018</a:t>
             </a:fld>
             <a:endParaRPr lang="en-US"/>
           </a:p>
@@ -2517,7 +2768,7 @@
           <a:p>
             <a:fld id="{682A4499-B1C4-408B-B1EC-AB20400A948C}" type="datetimeFigureOut">
               <a:rPr lang="en-US" smtClean="0"/>
-              <a:t>11/7/2018</a:t>
+              <a:t>11/8/2018</a:t>
             </a:fld>
             <a:endParaRPr lang="en-US"/>
           </a:p>
@@ -2635,7 +2886,7 @@
           <a:p>
             <a:fld id="{682A4499-B1C4-408B-B1EC-AB20400A948C}" type="datetimeFigureOut">
               <a:rPr lang="en-US" smtClean="0"/>
-              <a:t>11/7/2018</a:t>
+              <a:t>11/8/2018</a:t>
             </a:fld>
             <a:endParaRPr lang="en-US"/>
           </a:p>
@@ -2730,7 +2981,7 @@
           <a:p>
             <a:fld id="{682A4499-B1C4-408B-B1EC-AB20400A948C}" type="datetimeFigureOut">
               <a:rPr lang="en-US" smtClean="0"/>
-              <a:t>11/7/2018</a:t>
+              <a:t>11/8/2018</a:t>
             </a:fld>
             <a:endParaRPr lang="en-US"/>
           </a:p>
@@ -3007,7 +3258,7 @@
           <a:p>
             <a:fld id="{682A4499-B1C4-408B-B1EC-AB20400A948C}" type="datetimeFigureOut">
               <a:rPr lang="en-US" smtClean="0"/>
-              <a:t>11/7/2018</a:t>
+              <a:t>11/8/2018</a:t>
             </a:fld>
             <a:endParaRPr lang="en-US"/>
           </a:p>
@@ -3260,7 +3511,7 @@
           <a:p>
             <a:fld id="{682A4499-B1C4-408B-B1EC-AB20400A948C}" type="datetimeFigureOut">
               <a:rPr lang="en-US" smtClean="0"/>
-              <a:t>11/7/2018</a:t>
+              <a:t>11/8/2018</a:t>
             </a:fld>
             <a:endParaRPr lang="en-US"/>
           </a:p>
@@ -3473,7 +3724,7 @@
           <a:p>
             <a:fld id="{682A4499-B1C4-408B-B1EC-AB20400A948C}" type="datetimeFigureOut">
               <a:rPr lang="en-US" smtClean="0"/>
-              <a:t>11/7/2018</a:t>
+              <a:t>11/8/2018</a:t>
             </a:fld>
             <a:endParaRPr lang="en-US"/>
           </a:p>
@@ -4944,6 +5195,633 @@
 </p:sld>
 </file>
 
+<file path=ppt/slides/slide16.xml><?xml version="1.0" encoding="utf-8"?>
+<p:sld xmlns:a="http://schemas.openxmlformats.org/drawingml/2006/main" xmlns:r="http://schemas.openxmlformats.org/officeDocument/2006/relationships" xmlns:p="http://schemas.openxmlformats.org/presentationml/2006/main">
+  <p:cSld>
+    <p:spTree>
+      <p:nvGrpSpPr>
+        <p:cNvPr id="1" name=""/>
+        <p:cNvGrpSpPr/>
+        <p:nvPr/>
+      </p:nvGrpSpPr>
+      <p:grpSpPr>
+        <a:xfrm>
+          <a:off x="0" y="0"/>
+          <a:ext cx="0" cy="0"/>
+          <a:chOff x="0" y="0"/>
+          <a:chExt cx="0" cy="0"/>
+        </a:xfrm>
+      </p:grpSpPr>
+      <p:sp>
+        <p:nvSpPr>
+          <p:cNvPr id="2" name="Title 1"/>
+          <p:cNvSpPr>
+            <a:spLocks noGrp="1"/>
+          </p:cNvSpPr>
+          <p:nvPr>
+            <p:ph type="title"/>
+          </p:nvPr>
+        </p:nvSpPr>
+        <p:spPr/>
+        <p:txBody>
+          <a:bodyPr/>
+          <a:lstStyle/>
+          <a:p>
+            <a:r>
+              <a:rPr lang="en-US" dirty="0"/>
+              <a:t> </a:t>
+            </a:r>
+            <a:r>
+              <a:rPr lang="en-US" dirty="0" smtClean="0"/>
+              <a:t>gulp-rename</a:t>
+            </a:r>
+            <a:endParaRPr lang="en-US" dirty="0"/>
+          </a:p>
+        </p:txBody>
+      </p:sp>
+      <p:sp>
+        <p:nvSpPr>
+          <p:cNvPr id="3" name="Content Placeholder 2"/>
+          <p:cNvSpPr>
+            <a:spLocks noGrp="1"/>
+          </p:cNvSpPr>
+          <p:nvPr>
+            <p:ph idx="1"/>
+          </p:nvPr>
+        </p:nvSpPr>
+        <p:spPr/>
+        <p:txBody>
+          <a:bodyPr/>
+          <a:lstStyle/>
+          <a:p>
+            <a:pPr fontAlgn="base"/>
+            <a:r>
+              <a:rPr lang="en-US" dirty="0"/>
+              <a:t>W</a:t>
+            </a:r>
+            <a:r>
+              <a:rPr lang="en-US" dirty="0" smtClean="0"/>
+              <a:t>ith </a:t>
+            </a:r>
+            <a:r>
+              <a:rPr lang="en-US" dirty="0"/>
+              <a:t>one line of code, </a:t>
+            </a:r>
+            <a:r>
+              <a:rPr lang="en-US" dirty="0" smtClean="0"/>
+              <a:t>we can rename the </a:t>
+            </a:r>
+            <a:r>
+              <a:rPr lang="en-US" dirty="0"/>
+              <a:t>original file from app.js to app.min.js.</a:t>
+            </a:r>
+          </a:p>
+          <a:p>
+            <a:pPr fontAlgn="base"/>
+            <a:endParaRPr lang="en-US" dirty="0" smtClean="0"/>
+          </a:p>
+          <a:p>
+            <a:pPr fontAlgn="base"/>
+            <a:r>
+              <a:rPr lang="en-US" dirty="0" smtClean="0"/>
+              <a:t>We can </a:t>
+            </a:r>
+            <a:r>
+              <a:rPr lang="en-US" dirty="0"/>
+              <a:t>do that by piping the results of the </a:t>
+            </a:r>
+            <a:r>
+              <a:rPr lang="en-US" dirty="0" err="1"/>
+              <a:t>uglify</a:t>
+            </a:r>
+            <a:r>
+              <a:rPr lang="en-US" dirty="0"/>
+              <a:t> task to the </a:t>
+            </a:r>
+            <a:r>
+              <a:rPr lang="en-US" dirty="0" smtClean="0"/>
+              <a:t>rename method</a:t>
+            </a:r>
+            <a:r>
+              <a:rPr lang="en-US" dirty="0"/>
+              <a:t>.</a:t>
+            </a:r>
+          </a:p>
+          <a:p>
+            <a:pPr fontAlgn="base"/>
+            <a:endParaRPr lang="en-US" i="1" dirty="0"/>
+          </a:p>
+          <a:p>
+            <a:pPr fontAlgn="base"/>
+            <a:r>
+              <a:rPr lang="en-US" dirty="0" smtClean="0"/>
+              <a:t>And </a:t>
+            </a:r>
+            <a:r>
+              <a:rPr lang="en-US" dirty="0"/>
+              <a:t>then the parameter </a:t>
+            </a:r>
+            <a:r>
+              <a:rPr lang="en-US" dirty="0" smtClean="0"/>
+              <a:t>we </a:t>
+            </a:r>
+            <a:r>
+              <a:rPr lang="en-US" dirty="0"/>
+              <a:t>provide to the rename </a:t>
+            </a:r>
+            <a:r>
+              <a:rPr lang="en-US" dirty="0" smtClean="0"/>
+              <a:t>method is </a:t>
+            </a:r>
+            <a:r>
+              <a:rPr lang="en-US" dirty="0"/>
+              <a:t>going to be the name of the new file that </a:t>
+            </a:r>
+            <a:r>
+              <a:rPr lang="en-US" dirty="0" smtClean="0"/>
+              <a:t>we </a:t>
+            </a:r>
+            <a:r>
+              <a:rPr lang="en-US" dirty="0" err="1" smtClean="0"/>
+              <a:t>wanna</a:t>
+            </a:r>
+            <a:r>
+              <a:rPr lang="en-US" dirty="0" smtClean="0"/>
+              <a:t> create. </a:t>
+            </a:r>
+            <a:r>
+              <a:rPr lang="en-US" dirty="0"/>
+              <a:t>we'll call that app.min.js.</a:t>
+            </a:r>
+          </a:p>
+          <a:p>
+            <a:pPr marL="0" indent="0">
+              <a:buNone/>
+            </a:pPr>
+            <a:endParaRPr lang="en-US" dirty="0"/>
+          </a:p>
+        </p:txBody>
+      </p:sp>
+    </p:spTree>
+    <p:extLst>
+      <p:ext uri="{BB962C8B-B14F-4D97-AF65-F5344CB8AC3E}">
+        <p14:creationId xmlns:p14="http://schemas.microsoft.com/office/powerpoint/2010/main" val="1287742120"/>
+      </p:ext>
+    </p:extLst>
+  </p:cSld>
+  <p:clrMapOvr>
+    <a:masterClrMapping/>
+  </p:clrMapOvr>
+</p:sld>
+</file>
+
+<file path=ppt/slides/slide17.xml><?xml version="1.0" encoding="utf-8"?>
+<p:sld xmlns:a="http://schemas.openxmlformats.org/drawingml/2006/main" xmlns:r="http://schemas.openxmlformats.org/officeDocument/2006/relationships" xmlns:p="http://schemas.openxmlformats.org/presentationml/2006/main">
+  <p:cSld>
+    <p:spTree>
+      <p:nvGrpSpPr>
+        <p:cNvPr id="1" name=""/>
+        <p:cNvGrpSpPr/>
+        <p:nvPr/>
+      </p:nvGrpSpPr>
+      <p:grpSpPr>
+        <a:xfrm>
+          <a:off x="0" y="0"/>
+          <a:ext cx="0" cy="0"/>
+          <a:chOff x="0" y="0"/>
+          <a:chExt cx="0" cy="0"/>
+        </a:xfrm>
+      </p:grpSpPr>
+      <p:sp>
+        <p:nvSpPr>
+          <p:cNvPr id="2" name="Title 1"/>
+          <p:cNvSpPr>
+            <a:spLocks noGrp="1"/>
+          </p:cNvSpPr>
+          <p:nvPr>
+            <p:ph type="title"/>
+          </p:nvPr>
+        </p:nvSpPr>
+        <p:spPr/>
+        <p:txBody>
+          <a:bodyPr/>
+          <a:lstStyle/>
+          <a:p>
+            <a:r>
+              <a:rPr lang="en-US" dirty="0"/>
+              <a:t>Turn Sass into CSS, </a:t>
+            </a:r>
+            <a:r>
+              <a:rPr lang="en-US" dirty="0" smtClean="0"/>
+              <a:t>automatically</a:t>
+            </a:r>
+            <a:endParaRPr lang="en-US" dirty="0"/>
+          </a:p>
+        </p:txBody>
+      </p:sp>
+      <p:sp>
+        <p:nvSpPr>
+          <p:cNvPr id="3" name="Content Placeholder 2"/>
+          <p:cNvSpPr>
+            <a:spLocks noGrp="1"/>
+          </p:cNvSpPr>
+          <p:nvPr>
+            <p:ph idx="1"/>
+          </p:nvPr>
+        </p:nvSpPr>
+        <p:spPr/>
+        <p:txBody>
+          <a:bodyPr/>
+          <a:lstStyle/>
+          <a:p>
+            <a:r>
+              <a:rPr lang="en-US" dirty="0" err="1"/>
+              <a:t>npm</a:t>
+            </a:r>
+            <a:r>
+              <a:rPr lang="en-US" dirty="0"/>
+              <a:t> install </a:t>
+            </a:r>
+            <a:r>
+              <a:rPr lang="en-US" dirty="0" smtClean="0"/>
+              <a:t>gulp-sass –save-</a:t>
+            </a:r>
+            <a:r>
+              <a:rPr lang="en-US" dirty="0" err="1" smtClean="0"/>
+              <a:t>dev</a:t>
+            </a:r>
+            <a:endParaRPr lang="en-US" dirty="0"/>
+          </a:p>
+        </p:txBody>
+      </p:sp>
+    </p:spTree>
+    <p:extLst>
+      <p:ext uri="{BB962C8B-B14F-4D97-AF65-F5344CB8AC3E}">
+        <p14:creationId xmlns:p14="http://schemas.microsoft.com/office/powerpoint/2010/main" val="1037715008"/>
+      </p:ext>
+    </p:extLst>
+  </p:cSld>
+  <p:clrMapOvr>
+    <a:masterClrMapping/>
+  </p:clrMapOvr>
+</p:sld>
+</file>
+
+<file path=ppt/slides/slide18.xml><?xml version="1.0" encoding="utf-8"?>
+<p:sld xmlns:a="http://schemas.openxmlformats.org/drawingml/2006/main" xmlns:r="http://schemas.openxmlformats.org/officeDocument/2006/relationships" xmlns:p="http://schemas.openxmlformats.org/presentationml/2006/main">
+  <p:cSld>
+    <p:spTree>
+      <p:nvGrpSpPr>
+        <p:cNvPr id="1" name=""/>
+        <p:cNvGrpSpPr/>
+        <p:nvPr/>
+      </p:nvGrpSpPr>
+      <p:grpSpPr>
+        <a:xfrm>
+          <a:off x="0" y="0"/>
+          <a:ext cx="0" cy="0"/>
+          <a:chOff x="0" y="0"/>
+          <a:chExt cx="0" cy="0"/>
+        </a:xfrm>
+      </p:grpSpPr>
+      <p:sp>
+        <p:nvSpPr>
+          <p:cNvPr id="2" name="Title 1"/>
+          <p:cNvSpPr>
+            <a:spLocks noGrp="1"/>
+          </p:cNvSpPr>
+          <p:nvPr>
+            <p:ph type="title"/>
+          </p:nvPr>
+        </p:nvSpPr>
+        <p:spPr/>
+        <p:txBody>
+          <a:bodyPr/>
+          <a:lstStyle/>
+          <a:p>
+            <a:r>
+              <a:rPr lang="en-US" dirty="0"/>
+              <a:t>Add Source Maps to your </a:t>
+            </a:r>
+            <a:r>
+              <a:rPr lang="en-US" dirty="0" err="1" smtClean="0"/>
+              <a:t>SaSS</a:t>
+            </a:r>
+            <a:endParaRPr lang="en-US" dirty="0"/>
+          </a:p>
+        </p:txBody>
+      </p:sp>
+      <p:sp>
+        <p:nvSpPr>
+          <p:cNvPr id="3" name="Content Placeholder 2"/>
+          <p:cNvSpPr>
+            <a:spLocks noGrp="1"/>
+          </p:cNvSpPr>
+          <p:nvPr>
+            <p:ph idx="1"/>
+          </p:nvPr>
+        </p:nvSpPr>
+        <p:spPr/>
+        <p:txBody>
+          <a:bodyPr>
+            <a:normAutofit lnSpcReduction="10000"/>
+          </a:bodyPr>
+          <a:lstStyle/>
+          <a:p>
+            <a:r>
+              <a:rPr lang="en-US" dirty="0"/>
+              <a:t>S</a:t>
+            </a:r>
+            <a:r>
+              <a:rPr lang="en-US" dirty="0" smtClean="0"/>
+              <a:t>ource </a:t>
+            </a:r>
+            <a:r>
+              <a:rPr lang="en-US" dirty="0"/>
+              <a:t>maps are an awesome way to save yourself time and </a:t>
+            </a:r>
+            <a:r>
+              <a:rPr lang="en-US" dirty="0" smtClean="0"/>
+              <a:t>frustration.</a:t>
+            </a:r>
+          </a:p>
+          <a:p>
+            <a:r>
+              <a:rPr lang="en-US" dirty="0" err="1" smtClean="0"/>
+              <a:t>npm</a:t>
+            </a:r>
+            <a:r>
+              <a:rPr lang="en-US" dirty="0" smtClean="0"/>
+              <a:t> </a:t>
+            </a:r>
+            <a:r>
+              <a:rPr lang="en-US" dirty="0"/>
+              <a:t>install </a:t>
+            </a:r>
+            <a:r>
+              <a:rPr lang="en-US" dirty="0" smtClean="0"/>
+              <a:t>gulp-</a:t>
+            </a:r>
+            <a:r>
+              <a:rPr lang="en-US" dirty="0" err="1" smtClean="0"/>
+              <a:t>sourcemaps</a:t>
+            </a:r>
+            <a:r>
+              <a:rPr lang="en-US" dirty="0" smtClean="0"/>
+              <a:t> –save-</a:t>
+            </a:r>
+            <a:r>
+              <a:rPr lang="en-US" dirty="0" err="1" smtClean="0"/>
+              <a:t>dev</a:t>
+            </a:r>
+            <a:endParaRPr lang="en-US" dirty="0" smtClean="0"/>
+          </a:p>
+          <a:p>
+            <a:endParaRPr lang="en-US" dirty="0"/>
+          </a:p>
+          <a:p>
+            <a:pPr fontAlgn="base"/>
+            <a:r>
+              <a:rPr lang="en-US" dirty="0"/>
+              <a:t>After </a:t>
+            </a:r>
+            <a:r>
+              <a:rPr lang="en-US" dirty="0" smtClean="0"/>
+              <a:t>we </a:t>
+            </a:r>
+            <a:r>
+              <a:rPr lang="en-US" dirty="0"/>
+              <a:t>grab </a:t>
+            </a:r>
+            <a:r>
+              <a:rPr lang="en-US" dirty="0" smtClean="0"/>
+              <a:t>our </a:t>
+            </a:r>
+            <a:r>
+              <a:rPr lang="en-US" dirty="0" err="1"/>
+              <a:t>application.sass</a:t>
+            </a:r>
+            <a:r>
+              <a:rPr lang="en-US" dirty="0"/>
+              <a:t> source file with </a:t>
+            </a:r>
+            <a:r>
+              <a:rPr lang="en-US" dirty="0" smtClean="0"/>
+              <a:t>gulp, we’re </a:t>
+            </a:r>
+            <a:r>
+              <a:rPr lang="en-US" dirty="0"/>
+              <a:t>going to pipe it to the </a:t>
+            </a:r>
+            <a:r>
+              <a:rPr lang="en-US" dirty="0" err="1">
+                <a:solidFill>
+                  <a:srgbClr val="00B050"/>
+                </a:solidFill>
+              </a:rPr>
+              <a:t>maps.init</a:t>
+            </a:r>
+            <a:r>
+              <a:rPr lang="en-US" dirty="0"/>
+              <a:t> method</a:t>
+            </a:r>
+            <a:r>
+              <a:rPr lang="en-US" dirty="0" smtClean="0"/>
+              <a:t>.</a:t>
+            </a:r>
+          </a:p>
+          <a:p>
+            <a:pPr fontAlgn="base"/>
+            <a:endParaRPr lang="en-US" dirty="0"/>
+          </a:p>
+          <a:p>
+            <a:pPr fontAlgn="base"/>
+            <a:r>
+              <a:rPr lang="en-US" dirty="0"/>
+              <a:t>The maps module is going to do the second part of its work with the </a:t>
+            </a:r>
+            <a:r>
+              <a:rPr lang="en-US" dirty="0">
+                <a:solidFill>
+                  <a:srgbClr val="00B050"/>
+                </a:solidFill>
+              </a:rPr>
+              <a:t>write method</a:t>
+            </a:r>
+            <a:r>
+              <a:rPr lang="en-US" dirty="0" smtClean="0"/>
+              <a:t>. </a:t>
+            </a:r>
+            <a:r>
+              <a:rPr lang="en-US" dirty="0"/>
+              <a:t>The write method takes one </a:t>
+            </a:r>
+            <a:r>
+              <a:rPr lang="en-US" dirty="0" smtClean="0"/>
+              <a:t>parameter, which </a:t>
+            </a:r>
+            <a:r>
+              <a:rPr lang="en-US" dirty="0"/>
+              <a:t>is going to be the </a:t>
+            </a:r>
+            <a:r>
+              <a:rPr lang="en-US" dirty="0">
+                <a:solidFill>
+                  <a:srgbClr val="00B050"/>
+                </a:solidFill>
+              </a:rPr>
+              <a:t>current working </a:t>
+            </a:r>
+            <a:r>
+              <a:rPr lang="en-US" dirty="0" smtClean="0">
+                <a:solidFill>
+                  <a:srgbClr val="00B050"/>
+                </a:solidFill>
+              </a:rPr>
+              <a:t>directory relative </a:t>
+            </a:r>
+            <a:r>
+              <a:rPr lang="en-US" dirty="0">
+                <a:solidFill>
+                  <a:srgbClr val="00B050"/>
+                </a:solidFill>
+              </a:rPr>
+              <a:t>to the </a:t>
+            </a:r>
+            <a:r>
+              <a:rPr lang="en-US" dirty="0" err="1">
+                <a:solidFill>
+                  <a:srgbClr val="00B050"/>
+                </a:solidFill>
+              </a:rPr>
+              <a:t>gulp.dest</a:t>
+            </a:r>
+            <a:r>
+              <a:rPr lang="en-US" dirty="0">
+                <a:solidFill>
+                  <a:srgbClr val="00B050"/>
+                </a:solidFill>
+              </a:rPr>
+              <a:t> directory</a:t>
+            </a:r>
+            <a:r>
+              <a:rPr lang="en-US" dirty="0"/>
+              <a:t>.</a:t>
+            </a:r>
+          </a:p>
+          <a:p>
+            <a:pPr fontAlgn="base"/>
+            <a:endParaRPr lang="en-US" dirty="0"/>
+          </a:p>
+          <a:p>
+            <a:endParaRPr lang="en-US" dirty="0"/>
+          </a:p>
+        </p:txBody>
+      </p:sp>
+    </p:spTree>
+    <p:extLst>
+      <p:ext uri="{BB962C8B-B14F-4D97-AF65-F5344CB8AC3E}">
+        <p14:creationId xmlns:p14="http://schemas.microsoft.com/office/powerpoint/2010/main" val="414965197"/>
+      </p:ext>
+    </p:extLst>
+  </p:cSld>
+  <p:clrMapOvr>
+    <a:masterClrMapping/>
+  </p:clrMapOvr>
+</p:sld>
+</file>
+
+<file path=ppt/slides/slide19.xml><?xml version="1.0" encoding="utf-8"?>
+<p:sld xmlns:a="http://schemas.openxmlformats.org/drawingml/2006/main" xmlns:r="http://schemas.openxmlformats.org/officeDocument/2006/relationships" xmlns:p="http://schemas.openxmlformats.org/presentationml/2006/main">
+  <p:cSld>
+    <p:spTree>
+      <p:nvGrpSpPr>
+        <p:cNvPr id="1" name=""/>
+        <p:cNvGrpSpPr/>
+        <p:nvPr/>
+      </p:nvGrpSpPr>
+      <p:grpSpPr>
+        <a:xfrm>
+          <a:off x="0" y="0"/>
+          <a:ext cx="0" cy="0"/>
+          <a:chOff x="0" y="0"/>
+          <a:chExt cx="0" cy="0"/>
+        </a:xfrm>
+      </p:grpSpPr>
+      <p:sp>
+        <p:nvSpPr>
+          <p:cNvPr id="2" name="Title 1"/>
+          <p:cNvSpPr>
+            <a:spLocks noGrp="1"/>
+          </p:cNvSpPr>
+          <p:nvPr>
+            <p:ph type="title"/>
+          </p:nvPr>
+        </p:nvSpPr>
+        <p:spPr/>
+        <p:txBody>
+          <a:bodyPr/>
+          <a:lstStyle/>
+          <a:p>
+            <a:r>
+              <a:rPr lang="en-US" dirty="0"/>
+              <a:t>Source maps for </a:t>
+            </a:r>
+            <a:r>
+              <a:rPr lang="en-US" dirty="0" smtClean="0"/>
+              <a:t>JavaScript</a:t>
+            </a:r>
+            <a:endParaRPr lang="en-US" dirty="0"/>
+          </a:p>
+        </p:txBody>
+      </p:sp>
+      <p:sp>
+        <p:nvSpPr>
+          <p:cNvPr id="3" name="Content Placeholder 2"/>
+          <p:cNvSpPr>
+            <a:spLocks noGrp="1"/>
+          </p:cNvSpPr>
+          <p:nvPr>
+            <p:ph idx="1"/>
+          </p:nvPr>
+        </p:nvSpPr>
+        <p:spPr/>
+        <p:txBody>
+          <a:bodyPr/>
+          <a:lstStyle/>
+          <a:p>
+            <a:pPr fontAlgn="base"/>
+            <a:r>
+              <a:rPr lang="en-US" dirty="0"/>
+              <a:t>The same plug in we use to create our Sass source </a:t>
+            </a:r>
+            <a:r>
+              <a:rPr lang="en-US" dirty="0" smtClean="0"/>
+              <a:t>maps, can </a:t>
+            </a:r>
+            <a:r>
+              <a:rPr lang="en-US" dirty="0"/>
+              <a:t>be used to create JavaScript source maps as well.</a:t>
+            </a:r>
+          </a:p>
+          <a:p>
+            <a:endParaRPr lang="en-US" dirty="0"/>
+          </a:p>
+        </p:txBody>
+      </p:sp>
+    </p:spTree>
+    <p:extLst>
+      <p:ext uri="{BB962C8B-B14F-4D97-AF65-F5344CB8AC3E}">
+        <p14:creationId xmlns:p14="http://schemas.microsoft.com/office/powerpoint/2010/main" val="4087756504"/>
+      </p:ext>
+    </p:extLst>
+  </p:cSld>
+  <p:clrMapOvr>
+    <a:masterClrMapping/>
+  </p:clrMapOvr>
+</p:sld>
+</file>
+
 <file path=ppt/slides/slide2.xml><?xml version="1.0" encoding="utf-8"?>
 <p:sld xmlns:a="http://schemas.openxmlformats.org/drawingml/2006/main" xmlns:r="http://schemas.openxmlformats.org/officeDocument/2006/relationships" xmlns:p="http://schemas.openxmlformats.org/presentationml/2006/main">
   <p:cSld>
@@ -4991,6 +5869,532 @@
     <p:extLst>
       <p:ext uri="{BB962C8B-B14F-4D97-AF65-F5344CB8AC3E}">
         <p14:creationId xmlns:p14="http://schemas.microsoft.com/office/powerpoint/2010/main" val="3735945362"/>
+      </p:ext>
+    </p:extLst>
+  </p:cSld>
+  <p:clrMapOvr>
+    <a:masterClrMapping/>
+  </p:clrMapOvr>
+</p:sld>
+</file>
+
+<file path=ppt/slides/slide20.xml><?xml version="1.0" encoding="utf-8"?>
+<p:sld xmlns:a="http://schemas.openxmlformats.org/drawingml/2006/main" xmlns:r="http://schemas.openxmlformats.org/officeDocument/2006/relationships" xmlns:p="http://schemas.openxmlformats.org/presentationml/2006/main">
+  <p:cSld>
+    <p:spTree>
+      <p:nvGrpSpPr>
+        <p:cNvPr id="1" name=""/>
+        <p:cNvGrpSpPr/>
+        <p:nvPr/>
+      </p:nvGrpSpPr>
+      <p:grpSpPr>
+        <a:xfrm>
+          <a:off x="0" y="0"/>
+          <a:ext cx="0" cy="0"/>
+          <a:chOff x="0" y="0"/>
+          <a:chExt cx="0" cy="0"/>
+        </a:xfrm>
+      </p:grpSpPr>
+      <p:sp>
+        <p:nvSpPr>
+          <p:cNvPr id="2" name="Title 1"/>
+          <p:cNvSpPr>
+            <a:spLocks noGrp="1"/>
+          </p:cNvSpPr>
+          <p:nvPr>
+            <p:ph type="title"/>
+          </p:nvPr>
+        </p:nvSpPr>
+        <p:spPr/>
+        <p:txBody>
+          <a:bodyPr/>
+          <a:lstStyle/>
+          <a:p>
+            <a:r>
+              <a:rPr lang="en-US" dirty="0"/>
+              <a:t>Putting Multiple Tasks </a:t>
+            </a:r>
+            <a:r>
+              <a:rPr lang="en-US" dirty="0" smtClean="0"/>
+              <a:t>Together</a:t>
+            </a:r>
+            <a:endParaRPr lang="en-US" dirty="0"/>
+          </a:p>
+        </p:txBody>
+      </p:sp>
+      <p:sp>
+        <p:nvSpPr>
+          <p:cNvPr id="3" name="Content Placeholder 2"/>
+          <p:cNvSpPr>
+            <a:spLocks noGrp="1"/>
+          </p:cNvSpPr>
+          <p:nvPr>
+            <p:ph idx="1"/>
+          </p:nvPr>
+        </p:nvSpPr>
+        <p:spPr/>
+        <p:txBody>
+          <a:bodyPr/>
+          <a:lstStyle/>
+          <a:p>
+            <a:r>
+              <a:rPr lang="en-US" dirty="0" err="1"/>
+              <a:t>gulp.task</a:t>
+            </a:r>
+            <a:r>
+              <a:rPr lang="en-US" dirty="0"/>
+              <a:t>('build', ['</a:t>
+            </a:r>
+            <a:r>
+              <a:rPr lang="en-US" dirty="0" err="1"/>
+              <a:t>minifyScripts</a:t>
+            </a:r>
+            <a:r>
+              <a:rPr lang="en-US" dirty="0"/>
+              <a:t>', '</a:t>
+            </a:r>
+            <a:r>
+              <a:rPr lang="en-US" dirty="0" err="1"/>
+              <a:t>compileSass</a:t>
+            </a:r>
+            <a:r>
+              <a:rPr lang="en-US" dirty="0" smtClean="0"/>
+              <a:t>']);</a:t>
+            </a:r>
+            <a:endParaRPr lang="en-US" dirty="0"/>
+          </a:p>
+          <a:p>
+            <a:endParaRPr lang="en-US" dirty="0" smtClean="0"/>
+          </a:p>
+          <a:p>
+            <a:endParaRPr lang="en-US" dirty="0"/>
+          </a:p>
+          <a:p>
+            <a:r>
+              <a:rPr lang="en-US" dirty="0" err="1" smtClean="0"/>
+              <a:t>gulp.task</a:t>
+            </a:r>
+            <a:r>
+              <a:rPr lang="en-US" dirty="0"/>
+              <a:t>('</a:t>
+            </a:r>
+            <a:r>
+              <a:rPr lang="en-US" dirty="0" err="1"/>
+              <a:t>minifyScripts</a:t>
+            </a:r>
+            <a:r>
+              <a:rPr lang="en-US" dirty="0"/>
+              <a:t>', ['</a:t>
+            </a:r>
+            <a:r>
+              <a:rPr lang="en-US" dirty="0" err="1"/>
+              <a:t>concatScripts</a:t>
+            </a:r>
+            <a:r>
+              <a:rPr lang="en-US" dirty="0" smtClean="0"/>
+              <a:t>'], function </a:t>
+            </a:r>
+            <a:r>
+              <a:rPr lang="en-US" dirty="0"/>
+              <a:t>() =&gt; </a:t>
+            </a:r>
+            <a:r>
+              <a:rPr lang="en-US" dirty="0" smtClean="0"/>
+              <a:t>{});</a:t>
+            </a:r>
+          </a:p>
+          <a:p>
+            <a:endParaRPr lang="en-US" dirty="0"/>
+          </a:p>
+          <a:p>
+            <a:r>
+              <a:rPr lang="en-US" dirty="0" smtClean="0"/>
+              <a:t>We can define an array of dependencies for the task and multiple dependency tasks will run in parallel(order doesn’t matters). </a:t>
+            </a:r>
+            <a:endParaRPr lang="en-US" dirty="0"/>
+          </a:p>
+        </p:txBody>
+      </p:sp>
+    </p:spTree>
+    <p:extLst>
+      <p:ext uri="{BB962C8B-B14F-4D97-AF65-F5344CB8AC3E}">
+        <p14:creationId xmlns:p14="http://schemas.microsoft.com/office/powerpoint/2010/main" val="4017370715"/>
+      </p:ext>
+    </p:extLst>
+  </p:cSld>
+  <p:clrMapOvr>
+    <a:masterClrMapping/>
+  </p:clrMapOvr>
+</p:sld>
+</file>
+
+<file path=ppt/slides/slide21.xml><?xml version="1.0" encoding="utf-8"?>
+<p:sld xmlns:a="http://schemas.openxmlformats.org/drawingml/2006/main" xmlns:r="http://schemas.openxmlformats.org/officeDocument/2006/relationships" xmlns:p="http://schemas.openxmlformats.org/presentationml/2006/main">
+  <p:cSld>
+    <p:spTree>
+      <p:nvGrpSpPr>
+        <p:cNvPr id="1" name=""/>
+        <p:cNvGrpSpPr/>
+        <p:nvPr/>
+      </p:nvGrpSpPr>
+      <p:grpSpPr>
+        <a:xfrm>
+          <a:off x="0" y="0"/>
+          <a:ext cx="0" cy="0"/>
+          <a:chOff x="0" y="0"/>
+          <a:chExt cx="0" cy="0"/>
+        </a:xfrm>
+      </p:grpSpPr>
+      <p:sp>
+        <p:nvSpPr>
+          <p:cNvPr id="2" name="Title 1"/>
+          <p:cNvSpPr>
+            <a:spLocks noGrp="1"/>
+          </p:cNvSpPr>
+          <p:nvPr>
+            <p:ph type="title"/>
+          </p:nvPr>
+        </p:nvSpPr>
+        <p:spPr/>
+        <p:txBody>
+          <a:bodyPr>
+            <a:normAutofit/>
+          </a:bodyPr>
+          <a:lstStyle/>
+          <a:p>
+            <a:r>
+              <a:rPr lang="en-US" dirty="0"/>
+              <a:t>Automatically Run Tasks with Gulp’s Watch </a:t>
+            </a:r>
+            <a:r>
+              <a:rPr lang="en-US" dirty="0" smtClean="0"/>
+              <a:t>Method</a:t>
+            </a:r>
+            <a:endParaRPr lang="en-US" dirty="0"/>
+          </a:p>
+        </p:txBody>
+      </p:sp>
+      <p:sp>
+        <p:nvSpPr>
+          <p:cNvPr id="3" name="Content Placeholder 2"/>
+          <p:cNvSpPr>
+            <a:spLocks noGrp="1"/>
+          </p:cNvSpPr>
+          <p:nvPr>
+            <p:ph idx="1"/>
+          </p:nvPr>
+        </p:nvSpPr>
+        <p:spPr/>
+        <p:txBody>
+          <a:bodyPr/>
+          <a:lstStyle/>
+          <a:p>
+            <a:pPr fontAlgn="base"/>
+            <a:r>
+              <a:rPr lang="en-US" dirty="0"/>
+              <a:t>The watch method, just like it sounds, watches files </a:t>
+            </a:r>
+            <a:r>
+              <a:rPr lang="en-US" dirty="0" smtClean="0"/>
+              <a:t>for changes </a:t>
+            </a:r>
+            <a:r>
+              <a:rPr lang="en-US" dirty="0"/>
+              <a:t>and then runs </a:t>
+            </a:r>
+            <a:r>
+              <a:rPr lang="en-US" dirty="0" smtClean="0"/>
+              <a:t>tasks. </a:t>
+            </a:r>
+          </a:p>
+          <a:p>
+            <a:pPr fontAlgn="base"/>
+            <a:endParaRPr lang="en-US" dirty="0"/>
+          </a:p>
+          <a:p>
+            <a:pPr fontAlgn="base"/>
+            <a:r>
+              <a:rPr lang="en-US" dirty="0" smtClean="0"/>
+              <a:t>This </a:t>
+            </a:r>
+            <a:r>
+              <a:rPr lang="en-US" dirty="0"/>
+              <a:t>is incredibly useful, it allows you to write code and save </a:t>
+            </a:r>
+            <a:r>
+              <a:rPr lang="en-US" dirty="0" smtClean="0"/>
+              <a:t>files. You </a:t>
+            </a:r>
+            <a:r>
+              <a:rPr lang="en-US" dirty="0"/>
+              <a:t>just work and Gulp compiles Sass, creates source </a:t>
+            </a:r>
+            <a:r>
+              <a:rPr lang="en-US" dirty="0" smtClean="0"/>
+              <a:t>maps, refreshes </a:t>
+            </a:r>
+            <a:r>
+              <a:rPr lang="en-US" dirty="0"/>
+              <a:t>your browser or does any number of other tasks.</a:t>
+            </a:r>
+          </a:p>
+          <a:p>
+            <a:pPr marL="0" indent="0">
+              <a:buNone/>
+            </a:pPr>
+            <a:endParaRPr lang="en-US" dirty="0" smtClean="0"/>
+          </a:p>
+        </p:txBody>
+      </p:sp>
+    </p:spTree>
+    <p:extLst>
+      <p:ext uri="{BB962C8B-B14F-4D97-AF65-F5344CB8AC3E}">
+        <p14:creationId xmlns:p14="http://schemas.microsoft.com/office/powerpoint/2010/main" val="1803306222"/>
+      </p:ext>
+    </p:extLst>
+  </p:cSld>
+  <p:clrMapOvr>
+    <a:masterClrMapping/>
+  </p:clrMapOvr>
+</p:sld>
+</file>
+
+<file path=ppt/slides/slide22.xml><?xml version="1.0" encoding="utf-8"?>
+<p:sld xmlns:a="http://schemas.openxmlformats.org/drawingml/2006/main" xmlns:r="http://schemas.openxmlformats.org/officeDocument/2006/relationships" xmlns:p="http://schemas.openxmlformats.org/presentationml/2006/main">
+  <p:cSld>
+    <p:spTree>
+      <p:nvGrpSpPr>
+        <p:cNvPr id="1" name=""/>
+        <p:cNvGrpSpPr/>
+        <p:nvPr/>
+      </p:nvGrpSpPr>
+      <p:grpSpPr>
+        <a:xfrm>
+          <a:off x="0" y="0"/>
+          <a:ext cx="0" cy="0"/>
+          <a:chOff x="0" y="0"/>
+          <a:chExt cx="0" cy="0"/>
+        </a:xfrm>
+      </p:grpSpPr>
+      <p:sp>
+        <p:nvSpPr>
+          <p:cNvPr id="2" name="Title 1"/>
+          <p:cNvSpPr>
+            <a:spLocks noGrp="1"/>
+          </p:cNvSpPr>
+          <p:nvPr>
+            <p:ph type="title"/>
+          </p:nvPr>
+        </p:nvSpPr>
+        <p:spPr/>
+        <p:txBody>
+          <a:bodyPr/>
+          <a:lstStyle/>
+          <a:p>
+            <a:r>
+              <a:rPr lang="en-US" dirty="0"/>
+              <a:t>Automatically Run Tasks with Gulp’s Watch Method</a:t>
+            </a:r>
+          </a:p>
+        </p:txBody>
+      </p:sp>
+      <p:sp>
+        <p:nvSpPr>
+          <p:cNvPr id="3" name="Content Placeholder 2"/>
+          <p:cNvSpPr>
+            <a:spLocks noGrp="1"/>
+          </p:cNvSpPr>
+          <p:nvPr>
+            <p:ph idx="1"/>
+          </p:nvPr>
+        </p:nvSpPr>
+        <p:spPr/>
+        <p:txBody>
+          <a:bodyPr/>
+          <a:lstStyle/>
+          <a:p>
+            <a:r>
+              <a:rPr lang="en-US" dirty="0"/>
+              <a:t>In the </a:t>
+            </a:r>
+            <a:r>
+              <a:rPr lang="en-US" dirty="0" err="1"/>
+              <a:t>gulp.watch</a:t>
+            </a:r>
+            <a:r>
+              <a:rPr lang="en-US" dirty="0"/>
+              <a:t> method, we’re going to provide the file to be watched as the first parameter.</a:t>
+            </a:r>
+          </a:p>
+          <a:p>
+            <a:endParaRPr lang="en-US" dirty="0" smtClean="0"/>
+          </a:p>
+          <a:p>
+            <a:r>
+              <a:rPr lang="en-US" dirty="0"/>
+              <a:t>The first way would be to provide </a:t>
+            </a:r>
+            <a:r>
+              <a:rPr lang="en-US" dirty="0" smtClean="0"/>
+              <a:t>in an array </a:t>
+            </a:r>
+            <a:r>
+              <a:rPr lang="en-US" dirty="0"/>
+              <a:t>of files</a:t>
+            </a:r>
+            <a:r>
+              <a:rPr lang="en-US" dirty="0" smtClean="0"/>
+              <a:t>.</a:t>
+            </a:r>
+          </a:p>
+          <a:p>
+            <a:r>
+              <a:rPr lang="en-US" dirty="0" smtClean="0"/>
+              <a:t>Other way is </a:t>
+            </a:r>
+            <a:r>
+              <a:rPr lang="en-US" dirty="0"/>
+              <a:t>Gulp </a:t>
+            </a:r>
+            <a:r>
+              <a:rPr lang="en-US" dirty="0" err="1" smtClean="0"/>
+              <a:t>globbing</a:t>
+            </a:r>
+            <a:r>
+              <a:rPr lang="en-US" dirty="0" smtClean="0"/>
+              <a:t> </a:t>
+            </a:r>
+            <a:r>
+              <a:rPr lang="en-US" dirty="0"/>
+              <a:t>pattern</a:t>
+            </a:r>
+            <a:r>
+              <a:rPr lang="en-US" dirty="0" smtClean="0"/>
+              <a:t>.</a:t>
+            </a:r>
+          </a:p>
+          <a:p>
+            <a:endParaRPr lang="en-US" dirty="0"/>
+          </a:p>
+          <a:p>
+            <a:r>
+              <a:rPr lang="en-US" dirty="0"/>
+              <a:t>A </a:t>
+            </a:r>
+            <a:r>
+              <a:rPr lang="en-US" dirty="0" err="1"/>
+              <a:t>globbing</a:t>
+            </a:r>
+            <a:r>
+              <a:rPr lang="en-US" dirty="0"/>
+              <a:t> pattern is simply a syntax for matching the names of files</a:t>
+            </a:r>
+            <a:r>
+              <a:rPr lang="en-US" dirty="0" smtClean="0"/>
+              <a:t>.</a:t>
+            </a:r>
+          </a:p>
+          <a:p>
+            <a:r>
+              <a:rPr lang="en-US" dirty="0" smtClean="0"/>
+              <a:t>First parameter </a:t>
+            </a:r>
+            <a:r>
+              <a:rPr lang="en-US" dirty="0"/>
+              <a:t>can be an array or the string, if you're using a single </a:t>
+            </a:r>
+            <a:r>
+              <a:rPr lang="en-US" dirty="0" err="1"/>
+              <a:t>globbing</a:t>
+            </a:r>
+            <a:r>
+              <a:rPr lang="en-US" dirty="0"/>
+              <a:t> pattern.</a:t>
+            </a:r>
+            <a:endParaRPr lang="en-US" dirty="0"/>
+          </a:p>
+        </p:txBody>
+      </p:sp>
+    </p:spTree>
+    <p:extLst>
+      <p:ext uri="{BB962C8B-B14F-4D97-AF65-F5344CB8AC3E}">
+        <p14:creationId xmlns:p14="http://schemas.microsoft.com/office/powerpoint/2010/main" val="1462311508"/>
+      </p:ext>
+    </p:extLst>
+  </p:cSld>
+  <p:clrMapOvr>
+    <a:masterClrMapping/>
+  </p:clrMapOvr>
+</p:sld>
+</file>
+
+<file path=ppt/slides/slide23.xml><?xml version="1.0" encoding="utf-8"?>
+<p:sld xmlns:a="http://schemas.openxmlformats.org/drawingml/2006/main" xmlns:r="http://schemas.openxmlformats.org/officeDocument/2006/relationships" xmlns:p="http://schemas.openxmlformats.org/presentationml/2006/main">
+  <p:cSld>
+    <p:spTree>
+      <p:nvGrpSpPr>
+        <p:cNvPr id="1" name=""/>
+        <p:cNvGrpSpPr/>
+        <p:nvPr/>
+      </p:nvGrpSpPr>
+      <p:grpSpPr>
+        <a:xfrm>
+          <a:off x="0" y="0"/>
+          <a:ext cx="0" cy="0"/>
+          <a:chOff x="0" y="0"/>
+          <a:chExt cx="0" cy="0"/>
+        </a:xfrm>
+      </p:grpSpPr>
+      <p:sp>
+        <p:nvSpPr>
+          <p:cNvPr id="2" name="Title 1"/>
+          <p:cNvSpPr>
+            <a:spLocks noGrp="1"/>
+          </p:cNvSpPr>
+          <p:nvPr>
+            <p:ph type="title"/>
+          </p:nvPr>
+        </p:nvSpPr>
+        <p:spPr/>
+        <p:txBody>
+          <a:bodyPr/>
+          <a:lstStyle/>
+          <a:p>
+            <a:r>
+              <a:rPr lang="en-US" dirty="0" smtClean="0"/>
+              <a:t>Build and </a:t>
+            </a:r>
+            <a:r>
+              <a:rPr lang="en-US" smtClean="0"/>
+              <a:t>Development Pipeline</a:t>
+            </a:r>
+            <a:endParaRPr lang="en-US"/>
+          </a:p>
+        </p:txBody>
+      </p:sp>
+      <p:sp>
+        <p:nvSpPr>
+          <p:cNvPr id="3" name="Content Placeholder 2"/>
+          <p:cNvSpPr>
+            <a:spLocks noGrp="1"/>
+          </p:cNvSpPr>
+          <p:nvPr>
+            <p:ph idx="1"/>
+          </p:nvPr>
+        </p:nvSpPr>
+        <p:spPr/>
+        <p:txBody>
+          <a:bodyPr/>
+          <a:lstStyle/>
+          <a:p>
+            <a:endParaRPr lang="en-US"/>
+          </a:p>
+        </p:txBody>
+      </p:sp>
+    </p:spTree>
+    <p:extLst>
+      <p:ext uri="{BB962C8B-B14F-4D97-AF65-F5344CB8AC3E}">
+        <p14:creationId xmlns:p14="http://schemas.microsoft.com/office/powerpoint/2010/main" val="61700118"/>
       </p:ext>
     </p:extLst>
   </p:cSld>

</xml_diff>